<commit_message>
88: updates to rmcat slides
</commit_message>
<xml_diff>
--- a/88-app-traffic-model.pptx
+++ b/88-app-traffic-model.pptx
@@ -2,8 +2,14 @@
 <file path=ppt/presentation.xml><?xml version="1.0" encoding="utf-8"?>
 <p:presentation xmlns:a="http://schemas.openxmlformats.org/drawingml/2006/main" xmlns:r="http://schemas.openxmlformats.org/officeDocument/2006/relationships" xmlns:p="http://schemas.openxmlformats.org/presentationml/2006/main" showSpecialPlsOnTitleSld="0" saveSubsetFonts="1" autoCompressPictures="0">
   <p:sldMasterIdLst>
-    <p:sldMasterId id="2147483672" r:id="rId1"/>
+    <p:sldMasterId id="2147483684" r:id="rId1"/>
   </p:sldMasterIdLst>
+  <p:notesMasterIdLst>
+    <p:notesMasterId r:id="rId9"/>
+  </p:notesMasterIdLst>
+  <p:handoutMasterIdLst>
+    <p:handoutMasterId r:id="rId10"/>
+  </p:handoutMasterIdLst>
   <p:sldIdLst>
     <p:sldId id="256" r:id="rId2"/>
     <p:sldId id="258" r:id="rId3"/>
@@ -12,9 +18,8 @@
     <p:sldId id="260" r:id="rId6"/>
     <p:sldId id="261" r:id="rId7"/>
     <p:sldId id="262" r:id="rId8"/>
-    <p:sldId id="263" r:id="rId9"/>
   </p:sldIdLst>
-  <p:sldSz cx="9144000" cy="6858000" type="screen4x3"/>
+  <p:sldSz cx="9144000" cy="5143500" type="screen16x9"/>
   <p:notesSz cx="6858000" cy="9144000"/>
   <p:defaultTextStyle>
     <a:defPPr>
@@ -114,6 +119,612 @@
 </p:presentation>
 </file>
 
+<file path=ppt/handoutMasters/handoutMaster1.xml><?xml version="1.0" encoding="utf-8"?>
+<p:handoutMaster xmlns:a="http://schemas.openxmlformats.org/drawingml/2006/main" xmlns:r="http://schemas.openxmlformats.org/officeDocument/2006/relationships" xmlns:p="http://schemas.openxmlformats.org/presentationml/2006/main">
+  <p:cSld>
+    <p:bg>
+      <p:bgRef idx="1001">
+        <a:schemeClr val="bg1"/>
+      </p:bgRef>
+    </p:bg>
+    <p:spTree>
+      <p:nvGrpSpPr>
+        <p:cNvPr id="1" name=""/>
+        <p:cNvGrpSpPr/>
+        <p:nvPr/>
+      </p:nvGrpSpPr>
+      <p:grpSpPr>
+        <a:xfrm>
+          <a:off x="0" y="0"/>
+          <a:ext cx="0" cy="0"/>
+          <a:chOff x="0" y="0"/>
+          <a:chExt cx="0" cy="0"/>
+        </a:xfrm>
+      </p:grpSpPr>
+      <p:sp>
+        <p:nvSpPr>
+          <p:cNvPr id="2" name="Header Placeholder 1"/>
+          <p:cNvSpPr>
+            <a:spLocks noGrp="1"/>
+          </p:cNvSpPr>
+          <p:nvPr>
+            <p:ph type="hdr" sz="quarter"/>
+          </p:nvPr>
+        </p:nvSpPr>
+        <p:spPr>
+          <a:xfrm>
+            <a:off x="0" y="0"/>
+            <a:ext cx="2971800" cy="457200"/>
+          </a:xfrm>
+          <a:prstGeom prst="rect">
+            <a:avLst/>
+          </a:prstGeom>
+        </p:spPr>
+        <p:txBody>
+          <a:bodyPr vert="horz" lIns="91440" tIns="45720" rIns="91440" bIns="45720" rtlCol="0"/>
+          <a:lstStyle>
+            <a:lvl1pPr algn="l">
+              <a:defRPr sz="1200"/>
+            </a:lvl1pPr>
+          </a:lstStyle>
+          <a:p>
+            <a:endParaRPr lang="en-US"/>
+          </a:p>
+        </p:txBody>
+      </p:sp>
+      <p:sp>
+        <p:nvSpPr>
+          <p:cNvPr id="3" name="Date Placeholder 2"/>
+          <p:cNvSpPr>
+            <a:spLocks noGrp="1"/>
+          </p:cNvSpPr>
+          <p:nvPr>
+            <p:ph type="dt" sz="quarter" idx="1"/>
+          </p:nvPr>
+        </p:nvSpPr>
+        <p:spPr>
+          <a:xfrm>
+            <a:off x="3884613" y="0"/>
+            <a:ext cx="2971800" cy="457200"/>
+          </a:xfrm>
+          <a:prstGeom prst="rect">
+            <a:avLst/>
+          </a:prstGeom>
+        </p:spPr>
+        <p:txBody>
+          <a:bodyPr vert="horz" lIns="91440" tIns="45720" rIns="91440" bIns="45720" rtlCol="0"/>
+          <a:lstStyle>
+            <a:lvl1pPr algn="r">
+              <a:defRPr sz="1200"/>
+            </a:lvl1pPr>
+          </a:lstStyle>
+          <a:p>
+            <a:fld id="{E88430E7-FD6A-8946-808A-6AEAD2C32C0E}" type="datetimeFigureOut">
+              <a:rPr lang="en-US" smtClean="0"/>
+              <a:t>03/11/13</a:t>
+            </a:fld>
+            <a:endParaRPr lang="en-US"/>
+          </a:p>
+        </p:txBody>
+      </p:sp>
+      <p:sp>
+        <p:nvSpPr>
+          <p:cNvPr id="4" name="Footer Placeholder 3"/>
+          <p:cNvSpPr>
+            <a:spLocks noGrp="1"/>
+          </p:cNvSpPr>
+          <p:nvPr>
+            <p:ph type="ftr" sz="quarter" idx="2"/>
+          </p:nvPr>
+        </p:nvSpPr>
+        <p:spPr>
+          <a:xfrm>
+            <a:off x="0" y="8685213"/>
+            <a:ext cx="2971800" cy="457200"/>
+          </a:xfrm>
+          <a:prstGeom prst="rect">
+            <a:avLst/>
+          </a:prstGeom>
+        </p:spPr>
+        <p:txBody>
+          <a:bodyPr vert="horz" lIns="91440" tIns="45720" rIns="91440" bIns="45720" rtlCol="0" anchor="b"/>
+          <a:lstStyle>
+            <a:lvl1pPr algn="l">
+              <a:defRPr sz="1200"/>
+            </a:lvl1pPr>
+          </a:lstStyle>
+          <a:p>
+            <a:endParaRPr lang="en-US"/>
+          </a:p>
+        </p:txBody>
+      </p:sp>
+      <p:sp>
+        <p:nvSpPr>
+          <p:cNvPr id="5" name="Slide Number Placeholder 4"/>
+          <p:cNvSpPr>
+            <a:spLocks noGrp="1"/>
+          </p:cNvSpPr>
+          <p:nvPr>
+            <p:ph type="sldNum" sz="quarter" idx="3"/>
+          </p:nvPr>
+        </p:nvSpPr>
+        <p:spPr>
+          <a:xfrm>
+            <a:off x="3884613" y="8685213"/>
+            <a:ext cx="2971800" cy="457200"/>
+          </a:xfrm>
+          <a:prstGeom prst="rect">
+            <a:avLst/>
+          </a:prstGeom>
+        </p:spPr>
+        <p:txBody>
+          <a:bodyPr vert="horz" lIns="91440" tIns="45720" rIns="91440" bIns="45720" rtlCol="0" anchor="b"/>
+          <a:lstStyle>
+            <a:lvl1pPr algn="r">
+              <a:defRPr sz="1200"/>
+            </a:lvl1pPr>
+          </a:lstStyle>
+          <a:p>
+            <a:fld id="{F94387E1-392F-E14B-999B-5EB7893E6EC9}" type="slidenum">
+              <a:rPr lang="en-US" smtClean="0"/>
+              <a:t>‹#›</a:t>
+            </a:fld>
+            <a:endParaRPr lang="en-US"/>
+          </a:p>
+        </p:txBody>
+      </p:sp>
+    </p:spTree>
+    <p:extLst>
+      <p:ext uri="{BB962C8B-B14F-4D97-AF65-F5344CB8AC3E}">
+        <p14:creationId xmlns:p14="http://schemas.microsoft.com/office/powerpoint/2010/main" val="2368473439"/>
+      </p:ext>
+    </p:extLst>
+  </p:cSld>
+  <p:clrMap bg1="lt1" tx1="dk1" bg2="lt2" tx2="dk2" accent1="accent1" accent2="accent2" accent3="accent3" accent4="accent4" accent5="accent5" accent6="accent6" hlink="hlink" folHlink="folHlink"/>
+  <p:hf hdr="0" ftr="0" dt="0"/>
+</p:handoutMaster>
+</file>
+
+<file path=ppt/notesMasters/notesMaster1.xml><?xml version="1.0" encoding="utf-8"?>
+<p:notesMaster xmlns:a="http://schemas.openxmlformats.org/drawingml/2006/main" xmlns:r="http://schemas.openxmlformats.org/officeDocument/2006/relationships" xmlns:p="http://schemas.openxmlformats.org/presentationml/2006/main">
+  <p:cSld>
+    <p:bg>
+      <p:bgRef idx="1001">
+        <a:schemeClr val="bg1"/>
+      </p:bgRef>
+    </p:bg>
+    <p:spTree>
+      <p:nvGrpSpPr>
+        <p:cNvPr id="1" name=""/>
+        <p:cNvGrpSpPr/>
+        <p:nvPr/>
+      </p:nvGrpSpPr>
+      <p:grpSpPr>
+        <a:xfrm>
+          <a:off x="0" y="0"/>
+          <a:ext cx="0" cy="0"/>
+          <a:chOff x="0" y="0"/>
+          <a:chExt cx="0" cy="0"/>
+        </a:xfrm>
+      </p:grpSpPr>
+      <p:sp>
+        <p:nvSpPr>
+          <p:cNvPr id="2" name="Header Placeholder 1"/>
+          <p:cNvSpPr>
+            <a:spLocks noGrp="1"/>
+          </p:cNvSpPr>
+          <p:nvPr>
+            <p:ph type="hdr" sz="quarter"/>
+          </p:nvPr>
+        </p:nvSpPr>
+        <p:spPr>
+          <a:xfrm>
+            <a:off x="0" y="0"/>
+            <a:ext cx="2971800" cy="457200"/>
+          </a:xfrm>
+          <a:prstGeom prst="rect">
+            <a:avLst/>
+          </a:prstGeom>
+        </p:spPr>
+        <p:txBody>
+          <a:bodyPr vert="horz" lIns="91440" tIns="45720" rIns="91440" bIns="45720" rtlCol="0"/>
+          <a:lstStyle>
+            <a:lvl1pPr algn="l">
+              <a:defRPr sz="1200"/>
+            </a:lvl1pPr>
+          </a:lstStyle>
+          <a:p>
+            <a:endParaRPr lang="en-US"/>
+          </a:p>
+        </p:txBody>
+      </p:sp>
+      <p:sp>
+        <p:nvSpPr>
+          <p:cNvPr id="3" name="Date Placeholder 2"/>
+          <p:cNvSpPr>
+            <a:spLocks noGrp="1"/>
+          </p:cNvSpPr>
+          <p:nvPr>
+            <p:ph type="dt" idx="1"/>
+          </p:nvPr>
+        </p:nvSpPr>
+        <p:spPr>
+          <a:xfrm>
+            <a:off x="3884613" y="0"/>
+            <a:ext cx="2971800" cy="457200"/>
+          </a:xfrm>
+          <a:prstGeom prst="rect">
+            <a:avLst/>
+          </a:prstGeom>
+        </p:spPr>
+        <p:txBody>
+          <a:bodyPr vert="horz" lIns="91440" tIns="45720" rIns="91440" bIns="45720" rtlCol="0"/>
+          <a:lstStyle>
+            <a:lvl1pPr algn="r">
+              <a:defRPr sz="1200"/>
+            </a:lvl1pPr>
+          </a:lstStyle>
+          <a:p>
+            <a:fld id="{E718069C-D4E6-C249-AAD1-9DCD71A44A93}" type="datetimeFigureOut">
+              <a:rPr lang="en-US" smtClean="0"/>
+              <a:t>03/11/13</a:t>
+            </a:fld>
+            <a:endParaRPr lang="en-US"/>
+          </a:p>
+        </p:txBody>
+      </p:sp>
+      <p:sp>
+        <p:nvSpPr>
+          <p:cNvPr id="4" name="Slide Image Placeholder 3"/>
+          <p:cNvSpPr>
+            <a:spLocks noGrp="1" noRot="1" noChangeAspect="1"/>
+          </p:cNvSpPr>
+          <p:nvPr>
+            <p:ph type="sldImg" idx="2"/>
+          </p:nvPr>
+        </p:nvSpPr>
+        <p:spPr>
+          <a:xfrm>
+            <a:off x="381000" y="685800"/>
+            <a:ext cx="6096000" cy="3429000"/>
+          </a:xfrm>
+          <a:prstGeom prst="rect">
+            <a:avLst/>
+          </a:prstGeom>
+          <a:noFill/>
+          <a:ln w="12700">
+            <a:solidFill>
+              <a:prstClr val="black"/>
+            </a:solidFill>
+          </a:ln>
+        </p:spPr>
+        <p:txBody>
+          <a:bodyPr vert="horz" lIns="91440" tIns="45720" rIns="91440" bIns="45720" rtlCol="0" anchor="ctr"/>
+          <a:lstStyle/>
+          <a:p>
+            <a:endParaRPr lang="en-US"/>
+          </a:p>
+        </p:txBody>
+      </p:sp>
+      <p:sp>
+        <p:nvSpPr>
+          <p:cNvPr id="5" name="Notes Placeholder 4"/>
+          <p:cNvSpPr>
+            <a:spLocks noGrp="1"/>
+          </p:cNvSpPr>
+          <p:nvPr>
+            <p:ph type="body" sz="quarter" idx="3"/>
+          </p:nvPr>
+        </p:nvSpPr>
+        <p:spPr>
+          <a:xfrm>
+            <a:off x="685800" y="4343400"/>
+            <a:ext cx="5486400" cy="4114800"/>
+          </a:xfrm>
+          <a:prstGeom prst="rect">
+            <a:avLst/>
+          </a:prstGeom>
+        </p:spPr>
+        <p:txBody>
+          <a:bodyPr vert="horz" lIns="91440" tIns="45720" rIns="91440" bIns="45720" rtlCol="0"/>
+          <a:lstStyle/>
+          <a:p>
+            <a:pPr lvl="0"/>
+            <a:r>
+              <a:rPr lang="en-US" smtClean="0"/>
+              <a:t>Click to edit Master text styles</a:t>
+            </a:r>
+          </a:p>
+          <a:p>
+            <a:pPr lvl="1"/>
+            <a:r>
+              <a:rPr lang="en-US" smtClean="0"/>
+              <a:t>Second level</a:t>
+            </a:r>
+          </a:p>
+          <a:p>
+            <a:pPr lvl="2"/>
+            <a:r>
+              <a:rPr lang="en-US" smtClean="0"/>
+              <a:t>Third level</a:t>
+            </a:r>
+          </a:p>
+          <a:p>
+            <a:pPr lvl="3"/>
+            <a:r>
+              <a:rPr lang="en-US" smtClean="0"/>
+              <a:t>Fourth level</a:t>
+            </a:r>
+          </a:p>
+          <a:p>
+            <a:pPr lvl="4"/>
+            <a:r>
+              <a:rPr lang="en-US" smtClean="0"/>
+              <a:t>Fifth level</a:t>
+            </a:r>
+            <a:endParaRPr lang="en-US"/>
+          </a:p>
+        </p:txBody>
+      </p:sp>
+      <p:sp>
+        <p:nvSpPr>
+          <p:cNvPr id="6" name="Footer Placeholder 5"/>
+          <p:cNvSpPr>
+            <a:spLocks noGrp="1"/>
+          </p:cNvSpPr>
+          <p:nvPr>
+            <p:ph type="ftr" sz="quarter" idx="4"/>
+          </p:nvPr>
+        </p:nvSpPr>
+        <p:spPr>
+          <a:xfrm>
+            <a:off x="0" y="8685213"/>
+            <a:ext cx="2971800" cy="457200"/>
+          </a:xfrm>
+          <a:prstGeom prst="rect">
+            <a:avLst/>
+          </a:prstGeom>
+        </p:spPr>
+        <p:txBody>
+          <a:bodyPr vert="horz" lIns="91440" tIns="45720" rIns="91440" bIns="45720" rtlCol="0" anchor="b"/>
+          <a:lstStyle>
+            <a:lvl1pPr algn="l">
+              <a:defRPr sz="1200"/>
+            </a:lvl1pPr>
+          </a:lstStyle>
+          <a:p>
+            <a:endParaRPr lang="en-US"/>
+          </a:p>
+        </p:txBody>
+      </p:sp>
+      <p:sp>
+        <p:nvSpPr>
+          <p:cNvPr id="7" name="Slide Number Placeholder 6"/>
+          <p:cNvSpPr>
+            <a:spLocks noGrp="1"/>
+          </p:cNvSpPr>
+          <p:nvPr>
+            <p:ph type="sldNum" sz="quarter" idx="5"/>
+          </p:nvPr>
+        </p:nvSpPr>
+        <p:spPr>
+          <a:xfrm>
+            <a:off x="3884613" y="8685213"/>
+            <a:ext cx="2971800" cy="457200"/>
+          </a:xfrm>
+          <a:prstGeom prst="rect">
+            <a:avLst/>
+          </a:prstGeom>
+        </p:spPr>
+        <p:txBody>
+          <a:bodyPr vert="horz" lIns="91440" tIns="45720" rIns="91440" bIns="45720" rtlCol="0" anchor="b"/>
+          <a:lstStyle>
+            <a:lvl1pPr algn="r">
+              <a:defRPr sz="1200"/>
+            </a:lvl1pPr>
+          </a:lstStyle>
+          <a:p>
+            <a:fld id="{121F4181-960B-5549-81D6-FA8ED35DFFB0}" type="slidenum">
+              <a:rPr lang="en-US" smtClean="0"/>
+              <a:t>‹#›</a:t>
+            </a:fld>
+            <a:endParaRPr lang="en-US"/>
+          </a:p>
+        </p:txBody>
+      </p:sp>
+    </p:spTree>
+    <p:extLst>
+      <p:ext uri="{BB962C8B-B14F-4D97-AF65-F5344CB8AC3E}">
+        <p14:creationId xmlns:p14="http://schemas.microsoft.com/office/powerpoint/2010/main" val="4282515430"/>
+      </p:ext>
+    </p:extLst>
+  </p:cSld>
+  <p:clrMap bg1="lt1" tx1="dk1" bg2="lt2" tx2="dk2" accent1="accent1" accent2="accent2" accent3="accent3" accent4="accent4" accent5="accent5" accent6="accent6" hlink="hlink" folHlink="folHlink"/>
+  <p:hf hdr="0" ftr="0" dt="0"/>
+  <p:notesStyle>
+    <a:lvl1pPr marL="0" algn="l" defTabSz="457200" rtl="0" eaLnBrk="1" latinLnBrk="0" hangingPunct="1">
+      <a:defRPr sz="1200" kern="1200">
+        <a:solidFill>
+          <a:schemeClr val="tx1"/>
+        </a:solidFill>
+        <a:latin typeface="+mn-lt"/>
+        <a:ea typeface="+mn-ea"/>
+        <a:cs typeface="+mn-cs"/>
+      </a:defRPr>
+    </a:lvl1pPr>
+    <a:lvl2pPr marL="457200" algn="l" defTabSz="457200" rtl="0" eaLnBrk="1" latinLnBrk="0" hangingPunct="1">
+      <a:defRPr sz="1200" kern="1200">
+        <a:solidFill>
+          <a:schemeClr val="tx1"/>
+        </a:solidFill>
+        <a:latin typeface="+mn-lt"/>
+        <a:ea typeface="+mn-ea"/>
+        <a:cs typeface="+mn-cs"/>
+      </a:defRPr>
+    </a:lvl2pPr>
+    <a:lvl3pPr marL="914400" algn="l" defTabSz="457200" rtl="0" eaLnBrk="1" latinLnBrk="0" hangingPunct="1">
+      <a:defRPr sz="1200" kern="1200">
+        <a:solidFill>
+          <a:schemeClr val="tx1"/>
+        </a:solidFill>
+        <a:latin typeface="+mn-lt"/>
+        <a:ea typeface="+mn-ea"/>
+        <a:cs typeface="+mn-cs"/>
+      </a:defRPr>
+    </a:lvl3pPr>
+    <a:lvl4pPr marL="1371600" algn="l" defTabSz="457200" rtl="0" eaLnBrk="1" latinLnBrk="0" hangingPunct="1">
+      <a:defRPr sz="1200" kern="1200">
+        <a:solidFill>
+          <a:schemeClr val="tx1"/>
+        </a:solidFill>
+        <a:latin typeface="+mn-lt"/>
+        <a:ea typeface="+mn-ea"/>
+        <a:cs typeface="+mn-cs"/>
+      </a:defRPr>
+    </a:lvl4pPr>
+    <a:lvl5pPr marL="1828800" algn="l" defTabSz="457200" rtl="0" eaLnBrk="1" latinLnBrk="0" hangingPunct="1">
+      <a:defRPr sz="1200" kern="1200">
+        <a:solidFill>
+          <a:schemeClr val="tx1"/>
+        </a:solidFill>
+        <a:latin typeface="+mn-lt"/>
+        <a:ea typeface="+mn-ea"/>
+        <a:cs typeface="+mn-cs"/>
+      </a:defRPr>
+    </a:lvl5pPr>
+    <a:lvl6pPr marL="2286000" algn="l" defTabSz="457200" rtl="0" eaLnBrk="1" latinLnBrk="0" hangingPunct="1">
+      <a:defRPr sz="1200" kern="1200">
+        <a:solidFill>
+          <a:schemeClr val="tx1"/>
+        </a:solidFill>
+        <a:latin typeface="+mn-lt"/>
+        <a:ea typeface="+mn-ea"/>
+        <a:cs typeface="+mn-cs"/>
+      </a:defRPr>
+    </a:lvl6pPr>
+    <a:lvl7pPr marL="2743200" algn="l" defTabSz="457200" rtl="0" eaLnBrk="1" latinLnBrk="0" hangingPunct="1">
+      <a:defRPr sz="1200" kern="1200">
+        <a:solidFill>
+          <a:schemeClr val="tx1"/>
+        </a:solidFill>
+        <a:latin typeface="+mn-lt"/>
+        <a:ea typeface="+mn-ea"/>
+        <a:cs typeface="+mn-cs"/>
+      </a:defRPr>
+    </a:lvl7pPr>
+    <a:lvl8pPr marL="3200400" algn="l" defTabSz="457200" rtl="0" eaLnBrk="1" latinLnBrk="0" hangingPunct="1">
+      <a:defRPr sz="1200" kern="1200">
+        <a:solidFill>
+          <a:schemeClr val="tx1"/>
+        </a:solidFill>
+        <a:latin typeface="+mn-lt"/>
+        <a:ea typeface="+mn-ea"/>
+        <a:cs typeface="+mn-cs"/>
+      </a:defRPr>
+    </a:lvl8pPr>
+    <a:lvl9pPr marL="3657600" algn="l" defTabSz="457200" rtl="0" eaLnBrk="1" latinLnBrk="0" hangingPunct="1">
+      <a:defRPr sz="1200" kern="1200">
+        <a:solidFill>
+          <a:schemeClr val="tx1"/>
+        </a:solidFill>
+        <a:latin typeface="+mn-lt"/>
+        <a:ea typeface="+mn-ea"/>
+        <a:cs typeface="+mn-cs"/>
+      </a:defRPr>
+    </a:lvl9pPr>
+  </p:notesStyle>
+</p:notesMaster>
+</file>
+
+<file path=ppt/notesSlides/notesSlide1.xml><?xml version="1.0" encoding="utf-8"?>
+<p:notes xmlns:a="http://schemas.openxmlformats.org/drawingml/2006/main" xmlns:r="http://schemas.openxmlformats.org/officeDocument/2006/relationships" xmlns:p="http://schemas.openxmlformats.org/presentationml/2006/main">
+  <p:cSld>
+    <p:spTree>
+      <p:nvGrpSpPr>
+        <p:cNvPr id="1" name=""/>
+        <p:cNvGrpSpPr/>
+        <p:nvPr/>
+      </p:nvGrpSpPr>
+      <p:grpSpPr>
+        <a:xfrm>
+          <a:off x="0" y="0"/>
+          <a:ext cx="0" cy="0"/>
+          <a:chOff x="0" y="0"/>
+          <a:chExt cx="0" cy="0"/>
+        </a:xfrm>
+      </p:grpSpPr>
+      <p:sp>
+        <p:nvSpPr>
+          <p:cNvPr id="2" name="Slide Image Placeholder 1"/>
+          <p:cNvSpPr>
+            <a:spLocks noGrp="1" noRot="1" noChangeAspect="1"/>
+          </p:cNvSpPr>
+          <p:nvPr>
+            <p:ph type="sldImg"/>
+          </p:nvPr>
+        </p:nvSpPr>
+        <p:spPr>
+          <a:xfrm>
+            <a:off x="381000" y="685800"/>
+            <a:ext cx="6096000" cy="3429000"/>
+          </a:xfrm>
+        </p:spPr>
+      </p:sp>
+      <p:sp>
+        <p:nvSpPr>
+          <p:cNvPr id="3" name="Notes Placeholder 2"/>
+          <p:cNvSpPr>
+            <a:spLocks noGrp="1"/>
+          </p:cNvSpPr>
+          <p:nvPr>
+            <p:ph type="body" idx="1"/>
+          </p:nvPr>
+        </p:nvSpPr>
+        <p:spPr/>
+        <p:txBody>
+          <a:bodyPr/>
+          <a:lstStyle/>
+          <a:p>
+            <a:endParaRPr lang="en-US"/>
+          </a:p>
+        </p:txBody>
+      </p:sp>
+      <p:sp>
+        <p:nvSpPr>
+          <p:cNvPr id="4" name="Slide Number Placeholder 3"/>
+          <p:cNvSpPr>
+            <a:spLocks noGrp="1"/>
+          </p:cNvSpPr>
+          <p:nvPr>
+            <p:ph type="sldNum" sz="quarter" idx="10"/>
+          </p:nvPr>
+        </p:nvSpPr>
+        <p:spPr/>
+        <p:txBody>
+          <a:bodyPr/>
+          <a:lstStyle/>
+          <a:p>
+            <a:fld id="{121F4181-960B-5549-81D6-FA8ED35DFFB0}" type="slidenum">
+              <a:rPr lang="en-US" smtClean="0"/>
+              <a:t>7</a:t>
+            </a:fld>
+            <a:endParaRPr lang="en-US"/>
+          </a:p>
+        </p:txBody>
+      </p:sp>
+    </p:spTree>
+    <p:extLst>
+      <p:ext uri="{BB962C8B-B14F-4D97-AF65-F5344CB8AC3E}">
+        <p14:creationId xmlns:p14="http://schemas.microsoft.com/office/powerpoint/2010/main" val="1555590198"/>
+      </p:ext>
+    </p:extLst>
+  </p:cSld>
+  <p:clrMapOvr>
+    <a:masterClrMapping/>
+  </p:clrMapOvr>
+</p:notes>
+</file>
+
 <file path=ppt/slideLayouts/slideLayout1.xml><?xml version="1.0" encoding="utf-8"?>
 <p:sldLayout xmlns:a="http://schemas.openxmlformats.org/drawingml/2006/main" xmlns:r="http://schemas.openxmlformats.org/officeDocument/2006/relationships" xmlns:p="http://schemas.openxmlformats.org/presentationml/2006/main" type="title" preserve="1">
   <p:cSld name="Title Slide">
@@ -143,8 +754,8 @@
         </p:nvSpPr>
         <p:spPr>
           <a:xfrm>
-            <a:off x="685800" y="2130425"/>
-            <a:ext cx="7772400" cy="1470025"/>
+            <a:off x="685800" y="1597819"/>
+            <a:ext cx="7772400" cy="1102519"/>
           </a:xfrm>
         </p:spPr>
         <p:txBody>
@@ -171,8 +782,8 @@
         </p:nvSpPr>
         <p:spPr>
           <a:xfrm>
-            <a:off x="1371600" y="3886200"/>
-            <a:ext cx="6400800" cy="1752600"/>
+            <a:off x="1371600" y="2914650"/>
+            <a:ext cx="6400800" cy="1314450"/>
           </a:xfrm>
         </p:spPr>
         <p:txBody>
@@ -293,9 +904,9 @@
           <a:bodyPr/>
           <a:lstStyle/>
           <a:p>
-            <a:fld id="{47999F56-313A-D34F-90A8-6BF221D880B6}" type="datetime1">
-              <a:rPr lang="en-US" smtClean="0"/>
-              <a:t>02/11/13</a:t>
+            <a:fld id="{017DE04F-8DB5-DD42-ADED-86470FCF12D3}" type="datetime1">
+              <a:rPr lang="en-US" smtClean="0"/>
+              <a:t>03/11/13</a:t>
             </a:fld>
             <a:endParaRPr lang="en-US"/>
           </a:p>
@@ -313,8 +924,8 @@
         </p:nvSpPr>
         <p:spPr>
           <a:xfrm>
-            <a:off x="3124200" y="6356350"/>
-            <a:ext cx="2895600" cy="365125"/>
+            <a:off x="3124200" y="4767263"/>
+            <a:ext cx="2895600" cy="273844"/>
           </a:xfrm>
           <a:prstGeom prst="rect">
             <a:avLst/>
@@ -471,9 +1082,9 @@
           <a:bodyPr/>
           <a:lstStyle/>
           <a:p>
-            <a:fld id="{09341E78-EF60-0048-ABB6-DDEE6A47FE54}" type="datetime1">
-              <a:rPr lang="en-US" smtClean="0"/>
-              <a:t>02/11/13</a:t>
+            <a:fld id="{AA22E998-68F9-5B45-AADB-4D1F1F2B89C6}" type="datetime1">
+              <a:rPr lang="en-US" smtClean="0"/>
+              <a:t>03/11/13</a:t>
             </a:fld>
             <a:endParaRPr lang="en-US"/>
           </a:p>
@@ -491,8 +1102,8 @@
         </p:nvSpPr>
         <p:spPr>
           <a:xfrm>
-            <a:off x="3124200" y="6356350"/>
-            <a:ext cx="2895600" cy="365125"/>
+            <a:off x="3124200" y="4767263"/>
+            <a:ext cx="2895600" cy="273844"/>
           </a:xfrm>
           <a:prstGeom prst="rect">
             <a:avLst/>
@@ -571,8 +1182,8 @@
         </p:nvSpPr>
         <p:spPr>
           <a:xfrm>
-            <a:off x="6629400" y="274638"/>
-            <a:ext cx="2057400" cy="5851525"/>
+            <a:off x="6629400" y="205979"/>
+            <a:ext cx="2057400" cy="4388644"/>
           </a:xfrm>
         </p:spPr>
         <p:txBody>
@@ -599,8 +1210,8 @@
         </p:nvSpPr>
         <p:spPr>
           <a:xfrm>
-            <a:off x="457200" y="274638"/>
-            <a:ext cx="6019800" cy="5851525"/>
+            <a:off x="457200" y="205979"/>
+            <a:ext cx="6019800" cy="4388644"/>
           </a:xfrm>
         </p:spPr>
         <p:txBody>
@@ -659,9 +1270,9 @@
           <a:bodyPr/>
           <a:lstStyle/>
           <a:p>
-            <a:fld id="{7F46E4B4-6CB8-754F-8E23-18C0F4FFCB01}" type="datetime1">
-              <a:rPr lang="en-US" smtClean="0"/>
-              <a:t>02/11/13</a:t>
+            <a:fld id="{A57B2A1B-BFF6-FF4A-9A91-6239A851DB42}" type="datetime1">
+              <a:rPr lang="en-US" smtClean="0"/>
+              <a:t>03/11/13</a:t>
             </a:fld>
             <a:endParaRPr lang="en-US"/>
           </a:p>
@@ -679,8 +1290,8 @@
         </p:nvSpPr>
         <p:spPr>
           <a:xfrm>
-            <a:off x="3124200" y="6356350"/>
-            <a:ext cx="2895600" cy="365125"/>
+            <a:off x="3124200" y="4767263"/>
+            <a:ext cx="2895600" cy="273844"/>
           </a:xfrm>
           <a:prstGeom prst="rect">
             <a:avLst/>
@@ -837,9 +1448,9 @@
           <a:bodyPr/>
           <a:lstStyle/>
           <a:p>
-            <a:fld id="{E2F1085F-E7D7-3242-8212-F434425868B6}" type="datetime1">
-              <a:rPr lang="en-US" smtClean="0"/>
-              <a:t>02/11/13</a:t>
+            <a:fld id="{7BFD33A9-36AE-8F41-82B1-F5B43684D9C8}" type="datetime1">
+              <a:rPr lang="en-US" smtClean="0"/>
+              <a:t>03/11/13</a:t>
             </a:fld>
             <a:endParaRPr lang="en-US"/>
           </a:p>
@@ -857,8 +1468,8 @@
         </p:nvSpPr>
         <p:spPr>
           <a:xfrm>
-            <a:off x="3124200" y="6356350"/>
-            <a:ext cx="2895600" cy="365125"/>
+            <a:off x="3124200" y="4767263"/>
+            <a:ext cx="2895600" cy="273844"/>
           </a:xfrm>
           <a:prstGeom prst="rect">
             <a:avLst/>
@@ -889,9 +1500,14 @@
           <a:p>
             <a:fld id="{3015DC24-F02E-2B42-92F6-4C454B5C2ED6}" type="slidenum">
               <a:rPr lang="en-US" smtClean="0"/>
+              <a:pPr/>
               <a:t>‹#›</a:t>
             </a:fld>
-            <a:endParaRPr lang="en-US"/>
+            <a:r>
+              <a:rPr lang="en-US" smtClean="0"/>
+              <a:t> of 7</a:t>
+            </a:r>
+            <a:endParaRPr lang="en-US" dirty="0"/>
           </a:p>
         </p:txBody>
       </p:sp>
@@ -937,8 +1553,8 @@
         </p:nvSpPr>
         <p:spPr>
           <a:xfrm>
-            <a:off x="722313" y="4406900"/>
-            <a:ext cx="7772400" cy="1362075"/>
+            <a:off x="722313" y="3305176"/>
+            <a:ext cx="7772400" cy="1021556"/>
           </a:xfrm>
         </p:spPr>
         <p:txBody>
@@ -969,8 +1585,8 @@
         </p:nvSpPr>
         <p:spPr>
           <a:xfrm>
-            <a:off x="722313" y="2906713"/>
-            <a:ext cx="7772400" cy="1500187"/>
+            <a:off x="722313" y="2180035"/>
+            <a:ext cx="7772400" cy="1125140"/>
           </a:xfrm>
         </p:spPr>
         <p:txBody>
@@ -1091,9 +1707,9 @@
           <a:bodyPr/>
           <a:lstStyle/>
           <a:p>
-            <a:fld id="{7623C222-9E0F-F143-B998-57A66DA5E897}" type="datetime1">
-              <a:rPr lang="en-US" smtClean="0"/>
-              <a:t>02/11/13</a:t>
+            <a:fld id="{F87F5BBE-FDFD-D94E-A08F-CF6E038EA9A4}" type="datetime1">
+              <a:rPr lang="en-US" smtClean="0"/>
+              <a:t>03/11/13</a:t>
             </a:fld>
             <a:endParaRPr lang="en-US"/>
           </a:p>
@@ -1111,8 +1727,8 @@
         </p:nvSpPr>
         <p:spPr>
           <a:xfrm>
-            <a:off x="3124200" y="6356350"/>
-            <a:ext cx="2895600" cy="365125"/>
+            <a:off x="3124200" y="4767263"/>
+            <a:ext cx="2895600" cy="273844"/>
           </a:xfrm>
           <a:prstGeom prst="rect">
             <a:avLst/>
@@ -1214,8 +1830,8 @@
         </p:nvSpPr>
         <p:spPr>
           <a:xfrm>
-            <a:off x="457200" y="1600200"/>
-            <a:ext cx="4038600" cy="4525963"/>
+            <a:off x="457200" y="1200151"/>
+            <a:ext cx="4038600" cy="3394472"/>
           </a:xfrm>
         </p:spPr>
         <p:txBody>
@@ -1299,8 +1915,8 @@
         </p:nvSpPr>
         <p:spPr>
           <a:xfrm>
-            <a:off x="4648200" y="1600200"/>
-            <a:ext cx="4038600" cy="4525963"/>
+            <a:off x="4648200" y="1200151"/>
+            <a:ext cx="4038600" cy="3394472"/>
           </a:xfrm>
         </p:spPr>
         <p:txBody>
@@ -1387,9 +2003,9 @@
           <a:bodyPr/>
           <a:lstStyle/>
           <a:p>
-            <a:fld id="{508B0378-522F-4040-8D7A-827F49BC043B}" type="datetime1">
-              <a:rPr lang="en-US" smtClean="0"/>
-              <a:t>02/11/13</a:t>
+            <a:fld id="{247C0A99-D541-E348-BD6D-B4328A4059B8}" type="datetime1">
+              <a:rPr lang="en-US" smtClean="0"/>
+              <a:t>03/11/13</a:t>
             </a:fld>
             <a:endParaRPr lang="en-US"/>
           </a:p>
@@ -1407,8 +2023,8 @@
         </p:nvSpPr>
         <p:spPr>
           <a:xfrm>
-            <a:off x="3124200" y="6356350"/>
-            <a:ext cx="2895600" cy="365125"/>
+            <a:off x="3124200" y="4767263"/>
+            <a:ext cx="2895600" cy="273844"/>
           </a:xfrm>
           <a:prstGeom prst="rect">
             <a:avLst/>
@@ -1514,8 +2130,8 @@
         </p:nvSpPr>
         <p:spPr>
           <a:xfrm>
-            <a:off x="457200" y="1535113"/>
-            <a:ext cx="4040188" cy="639762"/>
+            <a:off x="457200" y="1151335"/>
+            <a:ext cx="4040188" cy="479822"/>
           </a:xfrm>
         </p:spPr>
         <p:txBody>
@@ -1579,8 +2195,8 @@
         </p:nvSpPr>
         <p:spPr>
           <a:xfrm>
-            <a:off x="457200" y="2174875"/>
-            <a:ext cx="4040188" cy="3951288"/>
+            <a:off x="457200" y="1631156"/>
+            <a:ext cx="4040188" cy="2963466"/>
           </a:xfrm>
         </p:spPr>
         <p:txBody>
@@ -1664,8 +2280,8 @@
         </p:nvSpPr>
         <p:spPr>
           <a:xfrm>
-            <a:off x="4645025" y="1535113"/>
-            <a:ext cx="4041775" cy="639762"/>
+            <a:off x="4645026" y="1151335"/>
+            <a:ext cx="4041775" cy="479822"/>
           </a:xfrm>
         </p:spPr>
         <p:txBody>
@@ -1729,8 +2345,8 @@
         </p:nvSpPr>
         <p:spPr>
           <a:xfrm>
-            <a:off x="4645025" y="2174875"/>
-            <a:ext cx="4041775" cy="3951288"/>
+            <a:off x="4645026" y="1631156"/>
+            <a:ext cx="4041775" cy="2963466"/>
           </a:xfrm>
         </p:spPr>
         <p:txBody>
@@ -1817,9 +2433,9 @@
           <a:bodyPr/>
           <a:lstStyle/>
           <a:p>
-            <a:fld id="{7D910712-1A9A-EE43-AD47-6B30928CE69D}" type="datetime1">
-              <a:rPr lang="en-US" smtClean="0"/>
-              <a:t>02/11/13</a:t>
+            <a:fld id="{11E92E68-BAAB-9146-A1B6-07EAD95725C4}" type="datetime1">
+              <a:rPr lang="en-US" smtClean="0"/>
+              <a:t>03/11/13</a:t>
             </a:fld>
             <a:endParaRPr lang="en-US"/>
           </a:p>
@@ -1837,8 +2453,8 @@
         </p:nvSpPr>
         <p:spPr>
           <a:xfrm>
-            <a:off x="3124200" y="6356350"/>
-            <a:ext cx="2895600" cy="365125"/>
+            <a:off x="3124200" y="4767263"/>
+            <a:ext cx="2895600" cy="273844"/>
           </a:xfrm>
           <a:prstGeom prst="rect">
             <a:avLst/>
@@ -1943,9 +2559,9 @@
           <a:bodyPr/>
           <a:lstStyle/>
           <a:p>
-            <a:fld id="{4DE1B5C0-70A5-1848-A5B5-E2ECDE6E3CE1}" type="datetime1">
-              <a:rPr lang="en-US" smtClean="0"/>
-              <a:t>02/11/13</a:t>
+            <a:fld id="{2DDD3F19-1B5C-6847-ABC6-E7736F548191}" type="datetime1">
+              <a:rPr lang="en-US" smtClean="0"/>
+              <a:t>03/11/13</a:t>
             </a:fld>
             <a:endParaRPr lang="en-US"/>
           </a:p>
@@ -1963,8 +2579,8 @@
         </p:nvSpPr>
         <p:spPr>
           <a:xfrm>
-            <a:off x="3124200" y="6356350"/>
-            <a:ext cx="2895600" cy="365125"/>
+            <a:off x="3124200" y="4767263"/>
+            <a:ext cx="2895600" cy="273844"/>
           </a:xfrm>
           <a:prstGeom prst="rect">
             <a:avLst/>
@@ -2046,9 +2662,9 @@
           <a:bodyPr/>
           <a:lstStyle/>
           <a:p>
-            <a:fld id="{AB436481-E6E3-8B4D-9F5F-F87C00DC5A40}" type="datetime1">
-              <a:rPr lang="en-US" smtClean="0"/>
-              <a:t>02/11/13</a:t>
+            <a:fld id="{E1E67F5C-8BE8-A24E-B4E1-C109B33739C8}" type="datetime1">
+              <a:rPr lang="en-US" smtClean="0"/>
+              <a:t>03/11/13</a:t>
             </a:fld>
             <a:endParaRPr lang="en-US"/>
           </a:p>
@@ -2066,8 +2682,8 @@
         </p:nvSpPr>
         <p:spPr>
           <a:xfrm>
-            <a:off x="3124200" y="6356350"/>
-            <a:ext cx="2895600" cy="365125"/>
+            <a:off x="3124200" y="4767263"/>
+            <a:ext cx="2895600" cy="273844"/>
           </a:xfrm>
           <a:prstGeom prst="rect">
             <a:avLst/>
@@ -2146,8 +2762,8 @@
         </p:nvSpPr>
         <p:spPr>
           <a:xfrm>
-            <a:off x="457200" y="273050"/>
-            <a:ext cx="3008313" cy="1162050"/>
+            <a:off x="457201" y="204787"/>
+            <a:ext cx="3008313" cy="871538"/>
           </a:xfrm>
         </p:spPr>
         <p:txBody>
@@ -2178,8 +2794,8 @@
         </p:nvSpPr>
         <p:spPr>
           <a:xfrm>
-            <a:off x="3575050" y="273050"/>
-            <a:ext cx="5111750" cy="5853113"/>
+            <a:off x="3575050" y="204788"/>
+            <a:ext cx="5111750" cy="4389835"/>
           </a:xfrm>
         </p:spPr>
         <p:txBody>
@@ -2263,8 +2879,8 @@
         </p:nvSpPr>
         <p:spPr>
           <a:xfrm>
-            <a:off x="457200" y="1435100"/>
-            <a:ext cx="3008313" cy="4691063"/>
+            <a:off x="457201" y="1076326"/>
+            <a:ext cx="3008313" cy="3518297"/>
           </a:xfrm>
         </p:spPr>
         <p:txBody>
@@ -2331,9 +2947,9 @@
           <a:bodyPr/>
           <a:lstStyle/>
           <a:p>
-            <a:fld id="{A885F57D-F407-984A-9E74-38CCF3A4E843}" type="datetime1">
-              <a:rPr lang="en-US" smtClean="0"/>
-              <a:t>02/11/13</a:t>
+            <a:fld id="{B67C11BB-0DB0-5B42-8F91-DF737D398277}" type="datetime1">
+              <a:rPr lang="en-US" smtClean="0"/>
+              <a:t>03/11/13</a:t>
             </a:fld>
             <a:endParaRPr lang="en-US"/>
           </a:p>
@@ -2351,8 +2967,8 @@
         </p:nvSpPr>
         <p:spPr>
           <a:xfrm>
-            <a:off x="3124200" y="6356350"/>
-            <a:ext cx="2895600" cy="365125"/>
+            <a:off x="3124200" y="4767263"/>
+            <a:ext cx="2895600" cy="273844"/>
           </a:xfrm>
           <a:prstGeom prst="rect">
             <a:avLst/>
@@ -2431,8 +3047,8 @@
         </p:nvSpPr>
         <p:spPr>
           <a:xfrm>
-            <a:off x="1792288" y="4800600"/>
-            <a:ext cx="5486400" cy="566738"/>
+            <a:off x="1792288" y="3600450"/>
+            <a:ext cx="5486400" cy="425054"/>
           </a:xfrm>
         </p:spPr>
         <p:txBody>
@@ -2463,8 +3079,8 @@
         </p:nvSpPr>
         <p:spPr>
           <a:xfrm>
-            <a:off x="1792288" y="612775"/>
-            <a:ext cx="5486400" cy="4114800"/>
+            <a:off x="1792288" y="459581"/>
+            <a:ext cx="5486400" cy="3086100"/>
           </a:xfrm>
         </p:spPr>
         <p:txBody>
@@ -2528,8 +3144,8 @@
         </p:nvSpPr>
         <p:spPr>
           <a:xfrm>
-            <a:off x="1792288" y="5367338"/>
-            <a:ext cx="5486400" cy="804862"/>
+            <a:off x="1792288" y="4025503"/>
+            <a:ext cx="5486400" cy="603647"/>
           </a:xfrm>
         </p:spPr>
         <p:txBody>
@@ -2596,9 +3212,9 @@
           <a:bodyPr/>
           <a:lstStyle/>
           <a:p>
-            <a:fld id="{1BE96CA7-95CE-8941-ABAF-B458BB983695}" type="datetime1">
-              <a:rPr lang="en-US" smtClean="0"/>
-              <a:t>02/11/13</a:t>
+            <a:fld id="{D8C36E0C-14E9-884D-B001-F611531B6A40}" type="datetime1">
+              <a:rPr lang="en-US" smtClean="0"/>
+              <a:t>03/11/13</a:t>
             </a:fld>
             <a:endParaRPr lang="en-US"/>
           </a:p>
@@ -2616,8 +3232,8 @@
         </p:nvSpPr>
         <p:spPr>
           <a:xfrm>
-            <a:off x="3124200" y="6356350"/>
-            <a:ext cx="2895600" cy="365125"/>
+            <a:off x="3124200" y="4767263"/>
+            <a:ext cx="2895600" cy="273844"/>
           </a:xfrm>
           <a:prstGeom prst="rect">
             <a:avLst/>
@@ -2701,8 +3317,8 @@
         </p:nvSpPr>
         <p:spPr>
           <a:xfrm>
-            <a:off x="457200" y="274638"/>
-            <a:ext cx="8229600" cy="1143000"/>
+            <a:off x="457200" y="205979"/>
+            <a:ext cx="8229600" cy="857250"/>
           </a:xfrm>
           <a:prstGeom prst="rect">
             <a:avLst/>
@@ -2734,8 +3350,8 @@
         </p:nvSpPr>
         <p:spPr>
           <a:xfrm>
-            <a:off x="457200" y="1600200"/>
-            <a:ext cx="8229600" cy="4525963"/>
+            <a:off x="457200" y="1200151"/>
+            <a:ext cx="8229600" cy="3394472"/>
           </a:xfrm>
           <a:prstGeom prst="rect">
             <a:avLst/>
@@ -2796,8 +3412,8 @@
         </p:nvSpPr>
         <p:spPr>
           <a:xfrm>
-            <a:off x="457200" y="6356350"/>
-            <a:ext cx="2133600" cy="365125"/>
+            <a:off x="457200" y="4767263"/>
+            <a:ext cx="2133600" cy="273844"/>
           </a:xfrm>
           <a:prstGeom prst="rect">
             <a:avLst/>
@@ -2817,9 +3433,9 @@
             </a:lvl1pPr>
           </a:lstStyle>
           <a:p>
-            <a:fld id="{7C332DD4-F8C7-8A4E-A408-81D7766840DC}" type="datetime1">
-              <a:rPr lang="en-US" smtClean="0"/>
-              <a:t>02/11/13</a:t>
+            <a:fld id="{EC37A22F-F0F2-CF48-A513-B853DF007116}" type="datetime1">
+              <a:rPr lang="en-US" smtClean="0"/>
+              <a:t>03/11/13</a:t>
             </a:fld>
             <a:endParaRPr lang="en-US"/>
           </a:p>
@@ -2837,8 +3453,8 @@
         </p:nvSpPr>
         <p:spPr>
           <a:xfrm>
-            <a:off x="6553200" y="6356350"/>
-            <a:ext cx="2133600" cy="365125"/>
+            <a:off x="6553200" y="4767263"/>
+            <a:ext cx="2133600" cy="273844"/>
           </a:xfrm>
           <a:prstGeom prst="rect">
             <a:avLst/>
@@ -2864,6 +3480,10 @@
               <a:pPr/>
               <a:t>‹#›</a:t>
             </a:fld>
+            <a:r>
+              <a:rPr lang="en-US" smtClean="0"/>
+              <a:t> of 7</a:t>
+            </a:r>
             <a:endParaRPr lang="en-US" dirty="0"/>
           </a:p>
         </p:txBody>
@@ -2877,17 +3497,17 @@
   </p:cSld>
   <p:clrMap bg1="lt1" tx1="dk1" bg2="lt2" tx2="dk2" accent1="accent1" accent2="accent2" accent3="accent3" accent4="accent4" accent5="accent5" accent6="accent6" hlink="hlink" folHlink="folHlink"/>
   <p:sldLayoutIdLst>
-    <p:sldLayoutId id="2147483673" r:id="rId1"/>
-    <p:sldLayoutId id="2147483674" r:id="rId2"/>
-    <p:sldLayoutId id="2147483675" r:id="rId3"/>
-    <p:sldLayoutId id="2147483676" r:id="rId4"/>
-    <p:sldLayoutId id="2147483677" r:id="rId5"/>
-    <p:sldLayoutId id="2147483678" r:id="rId6"/>
-    <p:sldLayoutId id="2147483679" r:id="rId7"/>
-    <p:sldLayoutId id="2147483680" r:id="rId8"/>
-    <p:sldLayoutId id="2147483681" r:id="rId9"/>
-    <p:sldLayoutId id="2147483682" r:id="rId10"/>
-    <p:sldLayoutId id="2147483683" r:id="rId11"/>
+    <p:sldLayoutId id="2147483685" r:id="rId1"/>
+    <p:sldLayoutId id="2147483686" r:id="rId2"/>
+    <p:sldLayoutId id="2147483687" r:id="rId3"/>
+    <p:sldLayoutId id="2147483688" r:id="rId4"/>
+    <p:sldLayoutId id="2147483689" r:id="rId5"/>
+    <p:sldLayoutId id="2147483690" r:id="rId6"/>
+    <p:sldLayoutId id="2147483691" r:id="rId7"/>
+    <p:sldLayoutId id="2147483692" r:id="rId8"/>
+    <p:sldLayoutId id="2147483693" r:id="rId9"/>
+    <p:sldLayoutId id="2147483694" r:id="rId10"/>
+    <p:sldLayoutId id="2147483695" r:id="rId11"/>
   </p:sldLayoutIdLst>
   <p:hf hdr="0" ftr="0" dt="0"/>
   <p:txStyles>
@@ -3196,7 +3816,7 @@
         <p:spPr/>
         <p:txBody>
           <a:bodyPr>
-            <a:normAutofit fontScale="77500" lnSpcReduction="20000"/>
+            <a:normAutofit fontScale="70000" lnSpcReduction="20000"/>
           </a:bodyPr>
           <a:lstStyle/>
           <a:p>
@@ -3236,16 +3856,6 @@
             </a:r>
           </a:p>
           <a:p>
-            <a:r>
-              <a:rPr lang="en-US" dirty="0" smtClean="0">
-                <a:solidFill>
-                  <a:schemeClr val="tx2"/>
-                </a:solidFill>
-              </a:rPr>
-              <a:t>1230-1430</a:t>
-            </a:r>
-          </a:p>
-          <a:p>
             <a:endParaRPr lang="en-US" sz="2400" dirty="0" smtClean="0">
               <a:solidFill>
                 <a:schemeClr val="tx2"/>
@@ -3254,12 +3864,20 @@
           </a:p>
           <a:p>
             <a:r>
+              <a:rPr lang="en-US" sz="2400" dirty="0">
+                <a:solidFill>
+                  <a:schemeClr val="tx2"/>
+                </a:solidFill>
+              </a:rPr>
+              <a:t>Varun Singh, Colin </a:t>
+            </a:r>
+            <a:r>
               <a:rPr lang="en-US" sz="2400" dirty="0" smtClean="0">
                 <a:solidFill>
                   <a:schemeClr val="tx2"/>
                 </a:solidFill>
               </a:rPr>
-              <a:t>Colin Perkins, Varun Singh</a:t>
+              <a:t>Perkins</a:t>
             </a:r>
             <a:endParaRPr lang="en-US" sz="2400" dirty="0">
               <a:solidFill>
@@ -3279,6 +3897,13 @@
   <p:clrMapOvr>
     <a:masterClrMapping/>
   </p:clrMapOvr>
+  <p:timing>
+    <p:tnLst>
+      <p:par>
+        <p:cTn xmlns:p14="http://schemas.microsoft.com/office/powerpoint/2010/main" id="1" dur="indefinite" restart="never" nodeType="tmRoot"/>
+      </p:par>
+    </p:tnLst>
+  </p:timing>
 </p:sld>
 </file>
 
@@ -3335,13 +3960,36 @@
         <p:spPr/>
         <p:txBody>
           <a:bodyPr>
-            <a:normAutofit/>
+            <a:normAutofit fontScale="85000" lnSpcReduction="20000"/>
           </a:bodyPr>
           <a:lstStyle/>
           <a:p>
             <a:r>
               <a:rPr lang="en-US" dirty="0" smtClean="0"/>
-              <a:t>Note-takers?</a:t>
+              <a:t>Note</a:t>
+            </a:r>
+            <a:r>
+              <a:rPr lang="en-US" dirty="0"/>
+              <a:t> </a:t>
+            </a:r>
+            <a:r>
+              <a:rPr lang="en-US" dirty="0" smtClean="0"/>
+              <a:t>well applies!</a:t>
+            </a:r>
+            <a:endParaRPr lang="en-US" dirty="0" smtClean="0"/>
+          </a:p>
+          <a:p>
+            <a:pPr lvl="1"/>
+            <a:endParaRPr lang="en-US" dirty="0" smtClean="0"/>
+          </a:p>
+          <a:p>
+            <a:r>
+              <a:rPr lang="en-US" dirty="0" smtClean="0"/>
+              <a:t>Note</a:t>
+            </a:r>
+            <a:r>
+              <a:rPr lang="en-US" dirty="0" smtClean="0"/>
+              <a:t>-takers?</a:t>
             </a:r>
           </a:p>
           <a:p>
@@ -3375,7 +4023,11 @@
           <a:p>
             <a:r>
               <a:rPr lang="en-US" dirty="0" smtClean="0"/>
-              <a:t>Application design related</a:t>
+              <a:t>Congestion control design </a:t>
+            </a:r>
+            <a:r>
+              <a:rPr lang="en-US" dirty="0" smtClean="0"/>
+              <a:t>related</a:t>
             </a:r>
             <a:endParaRPr lang="en-US" dirty="0"/>
           </a:p>
@@ -3383,7 +4035,7 @@
       </p:sp>
       <p:sp>
         <p:nvSpPr>
-          <p:cNvPr id="4" name="Slide Number Placeholder 3"/>
+          <p:cNvPr id="5" name="Slide Number Placeholder 4"/>
           <p:cNvSpPr>
             <a:spLocks noGrp="1"/>
           </p:cNvSpPr>
@@ -3398,9 +4050,14 @@
           <a:p>
             <a:fld id="{3015DC24-F02E-2B42-92F6-4C454B5C2ED6}" type="slidenum">
               <a:rPr lang="en-US" smtClean="0"/>
+              <a:pPr/>
               <a:t>2</a:t>
             </a:fld>
-            <a:endParaRPr lang="en-US"/>
+            <a:r>
+              <a:rPr lang="en-US" smtClean="0"/>
+              <a:t> of 7</a:t>
+            </a:r>
+            <a:endParaRPr lang="en-US" dirty="0"/>
           </a:p>
         </p:txBody>
       </p:sp>
@@ -3414,6 +4071,13 @@
   <p:clrMapOvr>
     <a:masterClrMapping/>
   </p:clrMapOvr>
+  <p:timing>
+    <p:tnLst>
+      <p:par>
+        <p:cTn xmlns:p14="http://schemas.microsoft.com/office/powerpoint/2010/main" id="1" dur="indefinite" restart="never" nodeType="tmRoot"/>
+      </p:par>
+    </p:tnLst>
+  </p:timing>
 </p:sld>
 </file>
 
@@ -3467,10 +4131,15 @@
             <p:ph idx="1"/>
           </p:nvPr>
         </p:nvSpPr>
-        <p:spPr/>
+        <p:spPr>
+          <a:xfrm>
+            <a:off x="457200" y="1200150"/>
+            <a:ext cx="8229600" cy="3756453"/>
+          </a:xfrm>
+        </p:spPr>
         <p:txBody>
           <a:bodyPr>
-            <a:normAutofit fontScale="85000" lnSpcReduction="20000"/>
+            <a:normAutofit fontScale="70000" lnSpcReduction="20000"/>
           </a:bodyPr>
           <a:lstStyle/>
           <a:p>
@@ -3517,6 +4186,13 @@
           </a:p>
           <a:p>
             <a:pPr lvl="1"/>
+            <a:r>
+              <a:rPr lang="en-US" dirty="0" smtClean="0"/>
+              <a:t>Can we make an abstract model of a modern codec?</a:t>
+            </a:r>
+          </a:p>
+          <a:p>
+            <a:pPr lvl="1"/>
             <a:endParaRPr lang="en-US" dirty="0" smtClean="0"/>
           </a:p>
           <a:p>
@@ -3555,7 +4231,7 @@
       </p:sp>
       <p:sp>
         <p:nvSpPr>
-          <p:cNvPr id="4" name="Slide Number Placeholder 3"/>
+          <p:cNvPr id="5" name="Slide Number Placeholder 4"/>
           <p:cNvSpPr>
             <a:spLocks noGrp="1"/>
           </p:cNvSpPr>
@@ -3570,9 +4246,14 @@
           <a:p>
             <a:fld id="{3015DC24-F02E-2B42-92F6-4C454B5C2ED6}" type="slidenum">
               <a:rPr lang="en-US" smtClean="0"/>
+              <a:pPr/>
               <a:t>3</a:t>
             </a:fld>
-            <a:endParaRPr lang="en-US"/>
+            <a:r>
+              <a:rPr lang="en-US" smtClean="0"/>
+              <a:t> of 7</a:t>
+            </a:r>
+            <a:endParaRPr lang="en-US" dirty="0"/>
           </a:p>
         </p:txBody>
       </p:sp>
@@ -3586,6 +4267,13 @@
   <p:clrMapOvr>
     <a:masterClrMapping/>
   </p:clrMapOvr>
+  <p:timing>
+    <p:tnLst>
+      <p:par>
+        <p:cTn xmlns:p14="http://schemas.microsoft.com/office/powerpoint/2010/main" id="1" dur="indefinite" restart="never" nodeType="tmRoot"/>
+      </p:par>
+    </p:tnLst>
+  </p:timing>
 </p:sld>
 </file>
 
@@ -3642,7 +4330,7 @@
         <p:spPr/>
         <p:txBody>
           <a:bodyPr>
-            <a:normAutofit fontScale="92500" lnSpcReduction="20000"/>
+            <a:normAutofit fontScale="70000" lnSpcReduction="20000"/>
           </a:bodyPr>
           <a:lstStyle/>
           <a:p>
@@ -3656,8 +4344,20 @@
             </a:r>
             <a:r>
               <a:rPr lang="en-US" dirty="0" smtClean="0"/>
-              <a:t>rate?</a:t>
-            </a:r>
+              <a:t>rate</a:t>
+            </a:r>
+            <a:r>
+              <a:rPr lang="en-US" dirty="0" smtClean="0"/>
+              <a:t>?</a:t>
+            </a:r>
+          </a:p>
+          <a:p>
+            <a:pPr lvl="1"/>
+            <a:r>
+              <a:rPr lang="en-US" dirty="0" smtClean="0"/>
+              <a:t>Effects of I-Frame?</a:t>
+            </a:r>
+            <a:endParaRPr lang="en-US" dirty="0" smtClean="0"/>
           </a:p>
           <a:p>
             <a:endParaRPr lang="en-US" dirty="0"/>
@@ -3714,7 +4414,7 @@
       </p:sp>
       <p:sp>
         <p:nvSpPr>
-          <p:cNvPr id="4" name="Slide Number Placeholder 3"/>
+          <p:cNvPr id="5" name="Slide Number Placeholder 4"/>
           <p:cNvSpPr>
             <a:spLocks noGrp="1"/>
           </p:cNvSpPr>
@@ -3729,9 +4429,14 @@
           <a:p>
             <a:fld id="{3015DC24-F02E-2B42-92F6-4C454B5C2ED6}" type="slidenum">
               <a:rPr lang="en-US" smtClean="0"/>
+              <a:pPr/>
               <a:t>4</a:t>
             </a:fld>
-            <a:endParaRPr lang="en-US"/>
+            <a:r>
+              <a:rPr lang="en-US" smtClean="0"/>
+              <a:t> of 7</a:t>
+            </a:r>
+            <a:endParaRPr lang="en-US" dirty="0"/>
           </a:p>
         </p:txBody>
       </p:sp>
@@ -3745,6 +4450,13 @@
   <p:clrMapOvr>
     <a:masterClrMapping/>
   </p:clrMapOvr>
+  <p:timing>
+    <p:tnLst>
+      <p:par>
+        <p:cTn xmlns:p14="http://schemas.microsoft.com/office/powerpoint/2010/main" id="1" dur="indefinite" restart="never" nodeType="tmRoot"/>
+      </p:par>
+    </p:tnLst>
+  </p:timing>
 </p:sld>
 </file>
 
@@ -3800,7 +4512,9 @@
         </p:nvSpPr>
         <p:spPr/>
         <p:txBody>
-          <a:bodyPr/>
+          <a:bodyPr>
+            <a:normAutofit fontScale="92500" lnSpcReduction="20000"/>
+          </a:bodyPr>
           <a:lstStyle/>
           <a:p>
             <a:pPr marL="0" indent="0">
@@ -3834,8 +4548,28 @@
             <a:pPr lvl="1"/>
             <a:r>
               <a:rPr lang="en-US" dirty="0" smtClean="0"/>
-              <a:t>From the next frame?</a:t>
-            </a:r>
+              <a:t>From the next frame</a:t>
+            </a:r>
+            <a:r>
+              <a:rPr lang="en-US" dirty="0" smtClean="0"/>
+              <a:t>?</a:t>
+            </a:r>
+          </a:p>
+          <a:p>
+            <a:pPr lvl="1"/>
+            <a:r>
+              <a:rPr lang="en-US" dirty="0" smtClean="0"/>
+              <a:t>At the end of a </a:t>
+            </a:r>
+            <a:r>
+              <a:rPr lang="en-US" dirty="0" err="1" smtClean="0"/>
+              <a:t>GoP</a:t>
+            </a:r>
+            <a:r>
+              <a:rPr lang="en-US" dirty="0" smtClean="0"/>
+              <a:t> (I-Frame)?</a:t>
+            </a:r>
+            <a:endParaRPr lang="en-US" dirty="0" smtClean="0"/>
           </a:p>
           <a:p>
             <a:pPr lvl="1"/>
@@ -3873,7 +4607,7 @@
       </p:sp>
       <p:sp>
         <p:nvSpPr>
-          <p:cNvPr id="4" name="Slide Number Placeholder 3"/>
+          <p:cNvPr id="5" name="Slide Number Placeholder 4"/>
           <p:cNvSpPr>
             <a:spLocks noGrp="1"/>
           </p:cNvSpPr>
@@ -3888,9 +4622,14 @@
           <a:p>
             <a:fld id="{3015DC24-F02E-2B42-92F6-4C454B5C2ED6}" type="slidenum">
               <a:rPr lang="en-US" smtClean="0"/>
+              <a:pPr/>
               <a:t>5</a:t>
             </a:fld>
-            <a:endParaRPr lang="en-US"/>
+            <a:r>
+              <a:rPr lang="en-US" smtClean="0"/>
+              <a:t> of 7</a:t>
+            </a:r>
+            <a:endParaRPr lang="en-US" dirty="0"/>
           </a:p>
         </p:txBody>
       </p:sp>
@@ -3904,6 +4643,13 @@
   <p:clrMapOvr>
     <a:masterClrMapping/>
   </p:clrMapOvr>
+  <p:timing>
+    <p:tnLst>
+      <p:par>
+        <p:cTn xmlns:p14="http://schemas.microsoft.com/office/powerpoint/2010/main" id="1" dur="indefinite" restart="never" nodeType="tmRoot"/>
+      </p:par>
+    </p:tnLst>
+  </p:timing>
 </p:sld>
 </file>
 
@@ -3943,11 +4689,7 @@
           <a:p>
             <a:r>
               <a:rPr lang="en-US" dirty="0" smtClean="0"/>
-              <a:t>RMCAT and </a:t>
-            </a:r>
-            <a:r>
-              <a:rPr lang="en-US" dirty="0" err="1" smtClean="0"/>
-              <a:t>RTCWeb</a:t>
+              <a:t>Who is in Control?</a:t>
             </a:r>
             <a:endParaRPr lang="en-US" dirty="0"/>
           </a:p>
@@ -3966,7 +4708,7 @@
         <p:spPr/>
         <p:txBody>
           <a:bodyPr>
-            <a:normAutofit fontScale="92500" lnSpcReduction="20000"/>
+            <a:normAutofit fontScale="62500" lnSpcReduction="20000"/>
           </a:bodyPr>
           <a:lstStyle/>
           <a:p>
@@ -4004,8 +4746,9 @@
           <a:p>
             <a:r>
               <a:rPr lang="en-US" dirty="0" smtClean="0"/>
-              <a:t>NACKs be part of application control or congestion control?</a:t>
-            </a:r>
+              <a:t>What is relationship between NACK/ACKs for reliability and congestion control?</a:t>
+            </a:r>
+            <a:endParaRPr lang="en-US" dirty="0" smtClean="0"/>
           </a:p>
           <a:p>
             <a:pPr lvl="1"/>
@@ -4014,11 +4757,7 @@
           <a:p>
             <a:r>
               <a:rPr lang="en-US" dirty="0" smtClean="0"/>
-              <a:t>FEC be part of congestion </a:t>
-            </a:r>
-            <a:r>
-              <a:rPr lang="en-US" dirty="0"/>
-              <a:t>control, </a:t>
+              <a:t>What is the relationship of FEC  for reliability and rate probing?</a:t>
             </a:r>
             <a:endParaRPr lang="en-US" dirty="0" smtClean="0"/>
           </a:p>
@@ -4026,7 +4765,7 @@
             <a:pPr lvl="1"/>
             <a:r>
               <a:rPr lang="en-US" dirty="0" smtClean="0"/>
-              <a:t>by </a:t>
+              <a:t>Probing by </a:t>
             </a:r>
             <a:r>
               <a:rPr lang="en-US" dirty="0"/>
@@ -4075,7 +4814,7 @@
       </p:sp>
       <p:sp>
         <p:nvSpPr>
-          <p:cNvPr id="4" name="Slide Number Placeholder 3"/>
+          <p:cNvPr id="5" name="Slide Number Placeholder 4"/>
           <p:cNvSpPr>
             <a:spLocks noGrp="1"/>
           </p:cNvSpPr>
@@ -4090,9 +4829,14 @@
           <a:p>
             <a:fld id="{3015DC24-F02E-2B42-92F6-4C454B5C2ED6}" type="slidenum">
               <a:rPr lang="en-US" smtClean="0"/>
+              <a:pPr/>
               <a:t>6</a:t>
             </a:fld>
-            <a:endParaRPr lang="en-US"/>
+            <a:r>
+              <a:rPr lang="en-US" smtClean="0"/>
+              <a:t> of 7</a:t>
+            </a:r>
+            <a:endParaRPr lang="en-US" dirty="0"/>
           </a:p>
         </p:txBody>
       </p:sp>
@@ -4106,6 +4850,13 @@
   <p:clrMapOvr>
     <a:masterClrMapping/>
   </p:clrMapOvr>
+  <p:timing>
+    <p:tnLst>
+      <p:par>
+        <p:cTn xmlns:p14="http://schemas.microsoft.com/office/powerpoint/2010/main" id="1" dur="indefinite" restart="never" nodeType="tmRoot"/>
+      </p:par>
+    </p:tnLst>
+  </p:timing>
 </p:sld>
 </file>
 
@@ -4143,7 +4894,7 @@
           <a:p>
             <a:r>
               <a:rPr lang="en-US" dirty="0" smtClean="0"/>
-              <a:t>RMCAT Design</a:t>
+              <a:t>Congestion Cues</a:t>
             </a:r>
             <a:endParaRPr lang="en-US" dirty="0"/>
           </a:p>
@@ -4162,17 +4913,21 @@
         <p:spPr/>
         <p:txBody>
           <a:bodyPr>
-            <a:normAutofit/>
+            <a:normAutofit fontScale="92500" lnSpcReduction="20000"/>
           </a:bodyPr>
           <a:lstStyle/>
           <a:p>
             <a:r>
               <a:rPr lang="en-US" dirty="0" smtClean="0"/>
-              <a:t>Path Chirp: probe the </a:t>
+              <a:t>Path Chirp: probe </a:t>
+            </a:r>
+            <a:r>
+              <a:rPr lang="en-US" dirty="0" smtClean="0"/>
+              <a:t>for bandwidth </a:t>
             </a:r>
             <a:r>
               <a:rPr lang="en-US" dirty="0"/>
-              <a:t>bandwidth by sending additional data packets in a certain </a:t>
+              <a:t>by sending additional data packets in a certain </a:t>
             </a:r>
             <a:r>
               <a:rPr lang="en-US" dirty="0" smtClean="0"/>
@@ -4196,7 +4951,11 @@
           <a:p>
             <a:r>
               <a:rPr lang="en-US" dirty="0" smtClean="0"/>
-              <a:t>Other congestion cues?</a:t>
+              <a:t>Delay and loss: What about other </a:t>
+            </a:r>
+            <a:r>
+              <a:rPr lang="en-US" dirty="0" smtClean="0"/>
+              <a:t>congestion cues?</a:t>
             </a:r>
             <a:endParaRPr lang="en-US" dirty="0"/>
           </a:p>
@@ -4222,7 +4981,7 @@
       </p:sp>
       <p:sp>
         <p:nvSpPr>
-          <p:cNvPr id="4" name="Slide Number Placeholder 3"/>
+          <p:cNvPr id="5" name="Slide Number Placeholder 4"/>
           <p:cNvSpPr>
             <a:spLocks noGrp="1"/>
           </p:cNvSpPr>
@@ -4237,9 +4996,14 @@
           <a:p>
             <a:fld id="{3015DC24-F02E-2B42-92F6-4C454B5C2ED6}" type="slidenum">
               <a:rPr lang="en-US" smtClean="0"/>
+              <a:pPr/>
               <a:t>7</a:t>
             </a:fld>
-            <a:endParaRPr lang="en-US"/>
+            <a:r>
+              <a:rPr lang="en-US" smtClean="0"/>
+              <a:t> of 7</a:t>
+            </a:r>
+            <a:endParaRPr lang="en-US" dirty="0"/>
           </a:p>
         </p:txBody>
       </p:sp>
@@ -4253,135 +5017,13 @@
   <p:clrMapOvr>
     <a:masterClrMapping/>
   </p:clrMapOvr>
-</p:sld>
-</file>
-
-<file path=ppt/slides/slide8.xml><?xml version="1.0" encoding="utf-8"?>
-<p:sld xmlns:a="http://schemas.openxmlformats.org/drawingml/2006/main" xmlns:r="http://schemas.openxmlformats.org/officeDocument/2006/relationships" xmlns:p="http://schemas.openxmlformats.org/presentationml/2006/main">
-  <p:cSld>
-    <p:spTree>
-      <p:nvGrpSpPr>
-        <p:cNvPr id="1" name=""/>
-        <p:cNvGrpSpPr/>
-        <p:nvPr/>
-      </p:nvGrpSpPr>
-      <p:grpSpPr>
-        <a:xfrm>
-          <a:off x="0" y="0"/>
-          <a:ext cx="0" cy="0"/>
-          <a:chOff x="0" y="0"/>
-          <a:chExt cx="0" cy="0"/>
-        </a:xfrm>
-      </p:grpSpPr>
-      <p:sp>
-        <p:nvSpPr>
-          <p:cNvPr id="2" name="Title 1"/>
-          <p:cNvSpPr>
-            <a:spLocks noGrp="1"/>
-          </p:cNvSpPr>
-          <p:nvPr>
-            <p:ph type="title"/>
-          </p:nvPr>
-        </p:nvSpPr>
-        <p:spPr/>
-        <p:txBody>
-          <a:bodyPr/>
-          <a:lstStyle/>
-          <a:p>
-            <a:r>
-              <a:rPr lang="en-US" dirty="0" smtClean="0"/>
-              <a:t>Constraints API</a:t>
-            </a:r>
-            <a:endParaRPr lang="en-US" dirty="0"/>
-          </a:p>
-        </p:txBody>
-      </p:sp>
-      <p:sp>
-        <p:nvSpPr>
-          <p:cNvPr id="3" name="Content Placeholder 2"/>
-          <p:cNvSpPr>
-            <a:spLocks noGrp="1"/>
-          </p:cNvSpPr>
-          <p:nvPr>
-            <p:ph idx="1"/>
-          </p:nvPr>
-        </p:nvSpPr>
-        <p:spPr/>
-        <p:txBody>
-          <a:bodyPr/>
-          <a:lstStyle/>
-          <a:p>
-            <a:r>
-              <a:rPr lang="en-US" dirty="0" smtClean="0"/>
-              <a:t>Application </a:t>
-            </a:r>
-            <a:r>
-              <a:rPr lang="en-US" dirty="0"/>
-              <a:t>input on </a:t>
-            </a:r>
-            <a:r>
-              <a:rPr lang="en-US" dirty="0" smtClean="0"/>
-              <a:t>prioritization</a:t>
-            </a:r>
-          </a:p>
-          <a:p>
-            <a:pPr lvl="1"/>
-            <a:r>
-              <a:rPr lang="en-US" dirty="0" smtClean="0"/>
-              <a:t>audio </a:t>
-            </a:r>
-            <a:r>
-              <a:rPr lang="en-US" dirty="0" err="1"/>
-              <a:t>vs</a:t>
-            </a:r>
-            <a:r>
-              <a:rPr lang="en-US" dirty="0"/>
-              <a:t> video (</a:t>
-            </a:r>
-            <a:r>
-              <a:rPr lang="en-US" dirty="0" err="1"/>
-              <a:t>vs</a:t>
-            </a:r>
-            <a:r>
-              <a:rPr lang="en-US" dirty="0"/>
-              <a:t> data)</a:t>
-            </a:r>
-          </a:p>
-        </p:txBody>
-      </p:sp>
-      <p:sp>
-        <p:nvSpPr>
-          <p:cNvPr id="4" name="Slide Number Placeholder 3"/>
-          <p:cNvSpPr>
-            <a:spLocks noGrp="1"/>
-          </p:cNvSpPr>
-          <p:nvPr>
-            <p:ph type="sldNum" sz="quarter" idx="12"/>
-          </p:nvPr>
-        </p:nvSpPr>
-        <p:spPr/>
-        <p:txBody>
-          <a:bodyPr/>
-          <a:lstStyle/>
-          <a:p>
-            <a:fld id="{3015DC24-F02E-2B42-92F6-4C454B5C2ED6}" type="slidenum">
-              <a:rPr lang="en-US" smtClean="0"/>
-              <a:t>8</a:t>
-            </a:fld>
-            <a:endParaRPr lang="en-US"/>
-          </a:p>
-        </p:txBody>
-      </p:sp>
-    </p:spTree>
-    <p:extLst>
-      <p:ext uri="{BB962C8B-B14F-4D97-AF65-F5344CB8AC3E}">
-        <p14:creationId xmlns:p14="http://schemas.microsoft.com/office/powerpoint/2010/main" val="1188032393"/>
-      </p:ext>
-    </p:extLst>
-  </p:cSld>
-  <p:clrMapOvr>
-    <a:masterClrMapping/>
-  </p:clrMapOvr>
+  <p:timing>
+    <p:tnLst>
+      <p:par>
+        <p:cTn xmlns:p14="http://schemas.microsoft.com/office/powerpoint/2010/main" id="1" dur="indefinite" restart="never" nodeType="tmRoot"/>
+      </p:par>
+    </p:tnLst>
+  </p:timing>
 </p:sld>
 </file>
 
@@ -4703,4 +5345,644 @@
   </a:objectDefaults>
   <a:extraClrSchemeLst/>
 </a:theme>
+</file>
+
+<file path=ppt/theme/theme2.xml><?xml version="1.0" encoding="utf-8"?>
+<a:theme xmlns:a="http://schemas.openxmlformats.org/drawingml/2006/main" name="Office Theme">
+  <a:themeElements>
+    <a:clrScheme name="Office">
+      <a:dk1>
+        <a:sysClr val="windowText" lastClr="000000"/>
+      </a:dk1>
+      <a:lt1>
+        <a:sysClr val="window" lastClr="FFFFFF"/>
+      </a:lt1>
+      <a:dk2>
+        <a:srgbClr val="1F497D"/>
+      </a:dk2>
+      <a:lt2>
+        <a:srgbClr val="EEECE1"/>
+      </a:lt2>
+      <a:accent1>
+        <a:srgbClr val="4F81BD"/>
+      </a:accent1>
+      <a:accent2>
+        <a:srgbClr val="C0504D"/>
+      </a:accent2>
+      <a:accent3>
+        <a:srgbClr val="9BBB59"/>
+      </a:accent3>
+      <a:accent4>
+        <a:srgbClr val="8064A2"/>
+      </a:accent4>
+      <a:accent5>
+        <a:srgbClr val="4BACC6"/>
+      </a:accent5>
+      <a:accent6>
+        <a:srgbClr val="F79646"/>
+      </a:accent6>
+      <a:hlink>
+        <a:srgbClr val="0000FF"/>
+      </a:hlink>
+      <a:folHlink>
+        <a:srgbClr val="800080"/>
+      </a:folHlink>
+    </a:clrScheme>
+    <a:fontScheme name="Office">
+      <a:majorFont>
+        <a:latin typeface="Calibri"/>
+        <a:ea typeface=""/>
+        <a:cs typeface=""/>
+        <a:font script="Jpan" typeface="ＭＳ Ｐゴシック"/>
+        <a:font script="Hang" typeface="맑은 고딕"/>
+        <a:font script="Hans" typeface="宋体"/>
+        <a:font script="Hant" typeface="新細明體"/>
+        <a:font script="Arab" typeface="Times New Roman"/>
+        <a:font script="Hebr" typeface="Times New Roman"/>
+        <a:font script="Thai" typeface="Angsana New"/>
+        <a:font script="Ethi" typeface="Nyala"/>
+        <a:font script="Beng" typeface="Vrinda"/>
+        <a:font script="Gujr" typeface="Shruti"/>
+        <a:font script="Khmr" typeface="MoolBoran"/>
+        <a:font script="Knda" typeface="Tunga"/>
+        <a:font script="Guru" typeface="Raavi"/>
+        <a:font script="Cans" typeface="Euphemia"/>
+        <a:font script="Cher" typeface="Plantagenet Cherokee"/>
+        <a:font script="Yiii" typeface="Microsoft Yi Baiti"/>
+        <a:font script="Tibt" typeface="Microsoft Himalaya"/>
+        <a:font script="Thaa" typeface="MV Boli"/>
+        <a:font script="Deva" typeface="Mangal"/>
+        <a:font script="Telu" typeface="Gautami"/>
+        <a:font script="Taml" typeface="Latha"/>
+        <a:font script="Syrc" typeface="Estrangelo Edessa"/>
+        <a:font script="Orya" typeface="Kalinga"/>
+        <a:font script="Mlym" typeface="Kartika"/>
+        <a:font script="Laoo" typeface="DokChampa"/>
+        <a:font script="Sinh" typeface="Iskoola Pota"/>
+        <a:font script="Mong" typeface="Mongolian Baiti"/>
+        <a:font script="Viet" typeface="Times New Roman"/>
+        <a:font script="Uigh" typeface="Microsoft Uighur"/>
+        <a:font script="Geor" typeface="Sylfaen"/>
+      </a:majorFont>
+      <a:minorFont>
+        <a:latin typeface="Calibri"/>
+        <a:ea typeface=""/>
+        <a:cs typeface=""/>
+        <a:font script="Jpan" typeface="ＭＳ Ｐゴシック"/>
+        <a:font script="Hang" typeface="맑은 고딕"/>
+        <a:font script="Hans" typeface="宋体"/>
+        <a:font script="Hant" typeface="新細明體"/>
+        <a:font script="Arab" typeface="Arial"/>
+        <a:font script="Hebr" typeface="Arial"/>
+        <a:font script="Thai" typeface="Cordia New"/>
+        <a:font script="Ethi" typeface="Nyala"/>
+        <a:font script="Beng" typeface="Vrinda"/>
+        <a:font script="Gujr" typeface="Shruti"/>
+        <a:font script="Khmr" typeface="DaunPenh"/>
+        <a:font script="Knda" typeface="Tunga"/>
+        <a:font script="Guru" typeface="Raavi"/>
+        <a:font script="Cans" typeface="Euphemia"/>
+        <a:font script="Cher" typeface="Plantagenet Cherokee"/>
+        <a:font script="Yiii" typeface="Microsoft Yi Baiti"/>
+        <a:font script="Tibt" typeface="Microsoft Himalaya"/>
+        <a:font script="Thaa" typeface="MV Boli"/>
+        <a:font script="Deva" typeface="Mangal"/>
+        <a:font script="Telu" typeface="Gautami"/>
+        <a:font script="Taml" typeface="Latha"/>
+        <a:font script="Syrc" typeface="Estrangelo Edessa"/>
+        <a:font script="Orya" typeface="Kalinga"/>
+        <a:font script="Mlym" typeface="Kartika"/>
+        <a:font script="Laoo" typeface="DokChampa"/>
+        <a:font script="Sinh" typeface="Iskoola Pota"/>
+        <a:font script="Mong" typeface="Mongolian Baiti"/>
+        <a:font script="Viet" typeface="Arial"/>
+        <a:font script="Uigh" typeface="Microsoft Uighur"/>
+        <a:font script="Geor" typeface="Sylfaen"/>
+      </a:minorFont>
+    </a:fontScheme>
+    <a:fmtScheme name="Office">
+      <a:fillStyleLst>
+        <a:solidFill>
+          <a:schemeClr val="phClr"/>
+        </a:solidFill>
+        <a:gradFill rotWithShape="1">
+          <a:gsLst>
+            <a:gs pos="0">
+              <a:schemeClr val="phClr">
+                <a:tint val="50000"/>
+                <a:satMod val="300000"/>
+              </a:schemeClr>
+            </a:gs>
+            <a:gs pos="35000">
+              <a:schemeClr val="phClr">
+                <a:tint val="37000"/>
+                <a:satMod val="300000"/>
+              </a:schemeClr>
+            </a:gs>
+            <a:gs pos="100000">
+              <a:schemeClr val="phClr">
+                <a:tint val="15000"/>
+                <a:satMod val="350000"/>
+              </a:schemeClr>
+            </a:gs>
+          </a:gsLst>
+          <a:lin ang="16200000" scaled="1"/>
+        </a:gradFill>
+        <a:gradFill rotWithShape="1">
+          <a:gsLst>
+            <a:gs pos="0">
+              <a:schemeClr val="phClr">
+                <a:tint val="100000"/>
+                <a:shade val="100000"/>
+                <a:satMod val="130000"/>
+              </a:schemeClr>
+            </a:gs>
+            <a:gs pos="100000">
+              <a:schemeClr val="phClr">
+                <a:tint val="50000"/>
+                <a:shade val="100000"/>
+                <a:satMod val="350000"/>
+              </a:schemeClr>
+            </a:gs>
+          </a:gsLst>
+          <a:lin ang="16200000" scaled="0"/>
+        </a:gradFill>
+      </a:fillStyleLst>
+      <a:lnStyleLst>
+        <a:ln w="9525" cap="flat" cmpd="sng" algn="ctr">
+          <a:solidFill>
+            <a:schemeClr val="phClr">
+              <a:shade val="95000"/>
+              <a:satMod val="105000"/>
+            </a:schemeClr>
+          </a:solidFill>
+          <a:prstDash val="solid"/>
+        </a:ln>
+        <a:ln w="25400" cap="flat" cmpd="sng" algn="ctr">
+          <a:solidFill>
+            <a:schemeClr val="phClr"/>
+          </a:solidFill>
+          <a:prstDash val="solid"/>
+        </a:ln>
+        <a:ln w="38100" cap="flat" cmpd="sng" algn="ctr">
+          <a:solidFill>
+            <a:schemeClr val="phClr"/>
+          </a:solidFill>
+          <a:prstDash val="solid"/>
+        </a:ln>
+      </a:lnStyleLst>
+      <a:effectStyleLst>
+        <a:effectStyle>
+          <a:effectLst>
+            <a:outerShdw blurRad="40000" dist="20000" dir="5400000" rotWithShape="0">
+              <a:srgbClr val="000000">
+                <a:alpha val="38000"/>
+              </a:srgbClr>
+            </a:outerShdw>
+          </a:effectLst>
+        </a:effectStyle>
+        <a:effectStyle>
+          <a:effectLst>
+            <a:outerShdw blurRad="40000" dist="23000" dir="5400000" rotWithShape="0">
+              <a:srgbClr val="000000">
+                <a:alpha val="35000"/>
+              </a:srgbClr>
+            </a:outerShdw>
+          </a:effectLst>
+        </a:effectStyle>
+        <a:effectStyle>
+          <a:effectLst>
+            <a:outerShdw blurRad="40000" dist="23000" dir="5400000" rotWithShape="0">
+              <a:srgbClr val="000000">
+                <a:alpha val="35000"/>
+              </a:srgbClr>
+            </a:outerShdw>
+          </a:effectLst>
+          <a:scene3d>
+            <a:camera prst="orthographicFront">
+              <a:rot lat="0" lon="0" rev="0"/>
+            </a:camera>
+            <a:lightRig rig="threePt" dir="t">
+              <a:rot lat="0" lon="0" rev="1200000"/>
+            </a:lightRig>
+          </a:scene3d>
+          <a:sp3d>
+            <a:bevelT w="63500" h="25400"/>
+          </a:sp3d>
+        </a:effectStyle>
+      </a:effectStyleLst>
+      <a:bgFillStyleLst>
+        <a:solidFill>
+          <a:schemeClr val="phClr"/>
+        </a:solidFill>
+        <a:gradFill rotWithShape="1">
+          <a:gsLst>
+            <a:gs pos="0">
+              <a:schemeClr val="phClr">
+                <a:tint val="40000"/>
+                <a:satMod val="350000"/>
+              </a:schemeClr>
+            </a:gs>
+            <a:gs pos="40000">
+              <a:schemeClr val="phClr">
+                <a:tint val="45000"/>
+                <a:shade val="99000"/>
+                <a:satMod val="350000"/>
+              </a:schemeClr>
+            </a:gs>
+            <a:gs pos="100000">
+              <a:schemeClr val="phClr">
+                <a:shade val="20000"/>
+                <a:satMod val="255000"/>
+              </a:schemeClr>
+            </a:gs>
+          </a:gsLst>
+          <a:path path="circle">
+            <a:fillToRect l="50000" t="-80000" r="50000" b="180000"/>
+          </a:path>
+        </a:gradFill>
+        <a:gradFill rotWithShape="1">
+          <a:gsLst>
+            <a:gs pos="0">
+              <a:schemeClr val="phClr">
+                <a:tint val="80000"/>
+                <a:satMod val="300000"/>
+              </a:schemeClr>
+            </a:gs>
+            <a:gs pos="100000">
+              <a:schemeClr val="phClr">
+                <a:shade val="30000"/>
+                <a:satMod val="200000"/>
+              </a:schemeClr>
+            </a:gs>
+          </a:gsLst>
+          <a:path path="circle">
+            <a:fillToRect l="50000" t="50000" r="50000" b="50000"/>
+          </a:path>
+        </a:gradFill>
+      </a:bgFillStyleLst>
+    </a:fmtScheme>
+  </a:themeElements>
+  <a:objectDefaults>
+    <a:spDef>
+      <a:spPr/>
+      <a:bodyPr/>
+      <a:lstStyle/>
+      <a:style>
+        <a:lnRef idx="1">
+          <a:schemeClr val="accent1"/>
+        </a:lnRef>
+        <a:fillRef idx="3">
+          <a:schemeClr val="accent1"/>
+        </a:fillRef>
+        <a:effectRef idx="2">
+          <a:schemeClr val="accent1"/>
+        </a:effectRef>
+        <a:fontRef idx="minor">
+          <a:schemeClr val="lt1"/>
+        </a:fontRef>
+      </a:style>
+    </a:spDef>
+    <a:lnDef>
+      <a:spPr/>
+      <a:bodyPr/>
+      <a:lstStyle/>
+      <a:style>
+        <a:lnRef idx="2">
+          <a:schemeClr val="accent1"/>
+        </a:lnRef>
+        <a:fillRef idx="0">
+          <a:schemeClr val="accent1"/>
+        </a:fillRef>
+        <a:effectRef idx="1">
+          <a:schemeClr val="accent1"/>
+        </a:effectRef>
+        <a:fontRef idx="minor">
+          <a:schemeClr val="tx1"/>
+        </a:fontRef>
+      </a:style>
+    </a:lnDef>
+  </a:objectDefaults>
+  <a:extraClrSchemeLst/>
+</a:theme>
+</file>
+
+<file path=ppt/theme/theme3.xml><?xml version="1.0" encoding="utf-8"?>
+<a:theme xmlns:a="http://schemas.openxmlformats.org/drawingml/2006/main" name="Office Theme">
+  <a:themeElements>
+    <a:clrScheme name="Office">
+      <a:dk1>
+        <a:sysClr val="windowText" lastClr="000000"/>
+      </a:dk1>
+      <a:lt1>
+        <a:sysClr val="window" lastClr="FFFFFF"/>
+      </a:lt1>
+      <a:dk2>
+        <a:srgbClr val="1F497D"/>
+      </a:dk2>
+      <a:lt2>
+        <a:srgbClr val="EEECE1"/>
+      </a:lt2>
+      <a:accent1>
+        <a:srgbClr val="4F81BD"/>
+      </a:accent1>
+      <a:accent2>
+        <a:srgbClr val="C0504D"/>
+      </a:accent2>
+      <a:accent3>
+        <a:srgbClr val="9BBB59"/>
+      </a:accent3>
+      <a:accent4>
+        <a:srgbClr val="8064A2"/>
+      </a:accent4>
+      <a:accent5>
+        <a:srgbClr val="4BACC6"/>
+      </a:accent5>
+      <a:accent6>
+        <a:srgbClr val="F79646"/>
+      </a:accent6>
+      <a:hlink>
+        <a:srgbClr val="0000FF"/>
+      </a:hlink>
+      <a:folHlink>
+        <a:srgbClr val="800080"/>
+      </a:folHlink>
+    </a:clrScheme>
+    <a:fontScheme name="Office">
+      <a:majorFont>
+        <a:latin typeface="Calibri"/>
+        <a:ea typeface=""/>
+        <a:cs typeface=""/>
+        <a:font script="Jpan" typeface="ＭＳ Ｐゴシック"/>
+        <a:font script="Hang" typeface="맑은 고딕"/>
+        <a:font script="Hans" typeface="宋体"/>
+        <a:font script="Hant" typeface="新細明體"/>
+        <a:font script="Arab" typeface="Times New Roman"/>
+        <a:font script="Hebr" typeface="Times New Roman"/>
+        <a:font script="Thai" typeface="Angsana New"/>
+        <a:font script="Ethi" typeface="Nyala"/>
+        <a:font script="Beng" typeface="Vrinda"/>
+        <a:font script="Gujr" typeface="Shruti"/>
+        <a:font script="Khmr" typeface="MoolBoran"/>
+        <a:font script="Knda" typeface="Tunga"/>
+        <a:font script="Guru" typeface="Raavi"/>
+        <a:font script="Cans" typeface="Euphemia"/>
+        <a:font script="Cher" typeface="Plantagenet Cherokee"/>
+        <a:font script="Yiii" typeface="Microsoft Yi Baiti"/>
+        <a:font script="Tibt" typeface="Microsoft Himalaya"/>
+        <a:font script="Thaa" typeface="MV Boli"/>
+        <a:font script="Deva" typeface="Mangal"/>
+        <a:font script="Telu" typeface="Gautami"/>
+        <a:font script="Taml" typeface="Latha"/>
+        <a:font script="Syrc" typeface="Estrangelo Edessa"/>
+        <a:font script="Orya" typeface="Kalinga"/>
+        <a:font script="Mlym" typeface="Kartika"/>
+        <a:font script="Laoo" typeface="DokChampa"/>
+        <a:font script="Sinh" typeface="Iskoola Pota"/>
+        <a:font script="Mong" typeface="Mongolian Baiti"/>
+        <a:font script="Viet" typeface="Times New Roman"/>
+        <a:font script="Uigh" typeface="Microsoft Uighur"/>
+        <a:font script="Geor" typeface="Sylfaen"/>
+      </a:majorFont>
+      <a:minorFont>
+        <a:latin typeface="Calibri"/>
+        <a:ea typeface=""/>
+        <a:cs typeface=""/>
+        <a:font script="Jpan" typeface="ＭＳ Ｐゴシック"/>
+        <a:font script="Hang" typeface="맑은 고딕"/>
+        <a:font script="Hans" typeface="宋体"/>
+        <a:font script="Hant" typeface="新細明體"/>
+        <a:font script="Arab" typeface="Arial"/>
+        <a:font script="Hebr" typeface="Arial"/>
+        <a:font script="Thai" typeface="Cordia New"/>
+        <a:font script="Ethi" typeface="Nyala"/>
+        <a:font script="Beng" typeface="Vrinda"/>
+        <a:font script="Gujr" typeface="Shruti"/>
+        <a:font script="Khmr" typeface="DaunPenh"/>
+        <a:font script="Knda" typeface="Tunga"/>
+        <a:font script="Guru" typeface="Raavi"/>
+        <a:font script="Cans" typeface="Euphemia"/>
+        <a:font script="Cher" typeface="Plantagenet Cherokee"/>
+        <a:font script="Yiii" typeface="Microsoft Yi Baiti"/>
+        <a:font script="Tibt" typeface="Microsoft Himalaya"/>
+        <a:font script="Thaa" typeface="MV Boli"/>
+        <a:font script="Deva" typeface="Mangal"/>
+        <a:font script="Telu" typeface="Gautami"/>
+        <a:font script="Taml" typeface="Latha"/>
+        <a:font script="Syrc" typeface="Estrangelo Edessa"/>
+        <a:font script="Orya" typeface="Kalinga"/>
+        <a:font script="Mlym" typeface="Kartika"/>
+        <a:font script="Laoo" typeface="DokChampa"/>
+        <a:font script="Sinh" typeface="Iskoola Pota"/>
+        <a:font script="Mong" typeface="Mongolian Baiti"/>
+        <a:font script="Viet" typeface="Arial"/>
+        <a:font script="Uigh" typeface="Microsoft Uighur"/>
+        <a:font script="Geor" typeface="Sylfaen"/>
+      </a:minorFont>
+    </a:fontScheme>
+    <a:fmtScheme name="Office">
+      <a:fillStyleLst>
+        <a:solidFill>
+          <a:schemeClr val="phClr"/>
+        </a:solidFill>
+        <a:gradFill rotWithShape="1">
+          <a:gsLst>
+            <a:gs pos="0">
+              <a:schemeClr val="phClr">
+                <a:tint val="50000"/>
+                <a:satMod val="300000"/>
+              </a:schemeClr>
+            </a:gs>
+            <a:gs pos="35000">
+              <a:schemeClr val="phClr">
+                <a:tint val="37000"/>
+                <a:satMod val="300000"/>
+              </a:schemeClr>
+            </a:gs>
+            <a:gs pos="100000">
+              <a:schemeClr val="phClr">
+                <a:tint val="15000"/>
+                <a:satMod val="350000"/>
+              </a:schemeClr>
+            </a:gs>
+          </a:gsLst>
+          <a:lin ang="16200000" scaled="1"/>
+        </a:gradFill>
+        <a:gradFill rotWithShape="1">
+          <a:gsLst>
+            <a:gs pos="0">
+              <a:schemeClr val="phClr">
+                <a:tint val="100000"/>
+                <a:shade val="100000"/>
+                <a:satMod val="130000"/>
+              </a:schemeClr>
+            </a:gs>
+            <a:gs pos="100000">
+              <a:schemeClr val="phClr">
+                <a:tint val="50000"/>
+                <a:shade val="100000"/>
+                <a:satMod val="350000"/>
+              </a:schemeClr>
+            </a:gs>
+          </a:gsLst>
+          <a:lin ang="16200000" scaled="0"/>
+        </a:gradFill>
+      </a:fillStyleLst>
+      <a:lnStyleLst>
+        <a:ln w="9525" cap="flat" cmpd="sng" algn="ctr">
+          <a:solidFill>
+            <a:schemeClr val="phClr">
+              <a:shade val="95000"/>
+              <a:satMod val="105000"/>
+            </a:schemeClr>
+          </a:solidFill>
+          <a:prstDash val="solid"/>
+        </a:ln>
+        <a:ln w="25400" cap="flat" cmpd="sng" algn="ctr">
+          <a:solidFill>
+            <a:schemeClr val="phClr"/>
+          </a:solidFill>
+          <a:prstDash val="solid"/>
+        </a:ln>
+        <a:ln w="38100" cap="flat" cmpd="sng" algn="ctr">
+          <a:solidFill>
+            <a:schemeClr val="phClr"/>
+          </a:solidFill>
+          <a:prstDash val="solid"/>
+        </a:ln>
+      </a:lnStyleLst>
+      <a:effectStyleLst>
+        <a:effectStyle>
+          <a:effectLst>
+            <a:outerShdw blurRad="40000" dist="20000" dir="5400000" rotWithShape="0">
+              <a:srgbClr val="000000">
+                <a:alpha val="38000"/>
+              </a:srgbClr>
+            </a:outerShdw>
+          </a:effectLst>
+        </a:effectStyle>
+        <a:effectStyle>
+          <a:effectLst>
+            <a:outerShdw blurRad="40000" dist="23000" dir="5400000" rotWithShape="0">
+              <a:srgbClr val="000000">
+                <a:alpha val="35000"/>
+              </a:srgbClr>
+            </a:outerShdw>
+          </a:effectLst>
+        </a:effectStyle>
+        <a:effectStyle>
+          <a:effectLst>
+            <a:outerShdw blurRad="40000" dist="23000" dir="5400000" rotWithShape="0">
+              <a:srgbClr val="000000">
+                <a:alpha val="35000"/>
+              </a:srgbClr>
+            </a:outerShdw>
+          </a:effectLst>
+          <a:scene3d>
+            <a:camera prst="orthographicFront">
+              <a:rot lat="0" lon="0" rev="0"/>
+            </a:camera>
+            <a:lightRig rig="threePt" dir="t">
+              <a:rot lat="0" lon="0" rev="1200000"/>
+            </a:lightRig>
+          </a:scene3d>
+          <a:sp3d>
+            <a:bevelT w="63500" h="25400"/>
+          </a:sp3d>
+        </a:effectStyle>
+      </a:effectStyleLst>
+      <a:bgFillStyleLst>
+        <a:solidFill>
+          <a:schemeClr val="phClr"/>
+        </a:solidFill>
+        <a:gradFill rotWithShape="1">
+          <a:gsLst>
+            <a:gs pos="0">
+              <a:schemeClr val="phClr">
+                <a:tint val="40000"/>
+                <a:satMod val="350000"/>
+              </a:schemeClr>
+            </a:gs>
+            <a:gs pos="40000">
+              <a:schemeClr val="phClr">
+                <a:tint val="45000"/>
+                <a:shade val="99000"/>
+                <a:satMod val="350000"/>
+              </a:schemeClr>
+            </a:gs>
+            <a:gs pos="100000">
+              <a:schemeClr val="phClr">
+                <a:shade val="20000"/>
+                <a:satMod val="255000"/>
+              </a:schemeClr>
+            </a:gs>
+          </a:gsLst>
+          <a:path path="circle">
+            <a:fillToRect l="50000" t="-80000" r="50000" b="180000"/>
+          </a:path>
+        </a:gradFill>
+        <a:gradFill rotWithShape="1">
+          <a:gsLst>
+            <a:gs pos="0">
+              <a:schemeClr val="phClr">
+                <a:tint val="80000"/>
+                <a:satMod val="300000"/>
+              </a:schemeClr>
+            </a:gs>
+            <a:gs pos="100000">
+              <a:schemeClr val="phClr">
+                <a:shade val="30000"/>
+                <a:satMod val="200000"/>
+              </a:schemeClr>
+            </a:gs>
+          </a:gsLst>
+          <a:path path="circle">
+            <a:fillToRect l="50000" t="50000" r="50000" b="50000"/>
+          </a:path>
+        </a:gradFill>
+      </a:bgFillStyleLst>
+    </a:fmtScheme>
+  </a:themeElements>
+  <a:objectDefaults>
+    <a:spDef>
+      <a:spPr/>
+      <a:bodyPr/>
+      <a:lstStyle/>
+      <a:style>
+        <a:lnRef idx="1">
+          <a:schemeClr val="accent1"/>
+        </a:lnRef>
+        <a:fillRef idx="3">
+          <a:schemeClr val="accent1"/>
+        </a:fillRef>
+        <a:effectRef idx="2">
+          <a:schemeClr val="accent1"/>
+        </a:effectRef>
+        <a:fontRef idx="minor">
+          <a:schemeClr val="lt1"/>
+        </a:fontRef>
+      </a:style>
+    </a:spDef>
+    <a:lnDef>
+      <a:spPr/>
+      <a:bodyPr/>
+      <a:lstStyle/>
+      <a:style>
+        <a:lnRef idx="2">
+          <a:schemeClr val="accent1"/>
+        </a:lnRef>
+        <a:fillRef idx="0">
+          <a:schemeClr val="accent1"/>
+        </a:fillRef>
+        <a:effectRef idx="1">
+          <a:schemeClr val="accent1"/>
+        </a:effectRef>
+        <a:fontRef idx="minor">
+          <a:schemeClr val="tx1"/>
+        </a:fontRef>
+      </a:style>
+    </a:lnDef>
+  </a:objectDefaults>
+  <a:extraClrSchemeLst/>
+</a:theme>
 </file>
</xml_diff>